<commit_message>
removed cab-internal from powerpoint
</commit_message>
<xml_diff>
--- a/2019-03-intro-to-service-oriented-distributed-systems/intro to service oriented distributed systems.pptx
+++ b/2019-03-intro-to-service-oriented-distributed-systems/intro to service oriented distributed systems.pptx
@@ -2,8 +2,11 @@
 <file path=ppt/presentation.xml><?xml version="1.0" encoding="utf-8"?>
 <p:presentation xmlns:a="http://schemas.openxmlformats.org/drawingml/2006/main" xmlns:r="http://schemas.openxmlformats.org/officeDocument/2006/relationships" xmlns:p="http://schemas.openxmlformats.org/presentationml/2006/main" saveSubsetFonts="1">
   <p:sldMasterIdLst>
-    <p:sldMasterId id="2147483648" r:id="rId1"/>
+    <p:sldMasterId id="2147483701" r:id="rId1"/>
   </p:sldMasterIdLst>
+  <p:notesMasterIdLst>
+    <p:notesMasterId r:id="rId14"/>
+  </p:notesMasterIdLst>
   <p:sldIdLst>
     <p:sldId id="256" r:id="rId2"/>
     <p:sldId id="271" r:id="rId3"/>
@@ -22,7 +25,7 @@
   <p:notesSz cx="6858000" cy="9144000"/>
   <p:defaultTextStyle>
     <a:defPPr>
-      <a:defRPr lang="sv-SE"/>
+      <a:defRPr lang="en-SE"/>
     </a:defPPr>
     <a:lvl1pPr marL="0" algn="l" defTabSz="914400" rtl="0" eaLnBrk="1" latinLnBrk="0" hangingPunct="1">
       <a:defRPr sz="1800" kern="1200">
@@ -131,6 +134,356 @@
 </p1510:revInfo>
 </file>
 
+<file path=ppt/notesMasters/notesMaster1.xml><?xml version="1.0" encoding="utf-8"?>
+<p:notesMaster xmlns:a="http://schemas.openxmlformats.org/drawingml/2006/main" xmlns:r="http://schemas.openxmlformats.org/officeDocument/2006/relationships" xmlns:p="http://schemas.openxmlformats.org/presentationml/2006/main">
+  <p:cSld>
+    <p:bg>
+      <p:bgRef idx="1001">
+        <a:schemeClr val="bg1"/>
+      </p:bgRef>
+    </p:bg>
+    <p:spTree>
+      <p:nvGrpSpPr>
+        <p:cNvPr id="1" name=""/>
+        <p:cNvGrpSpPr/>
+        <p:nvPr/>
+      </p:nvGrpSpPr>
+      <p:grpSpPr>
+        <a:xfrm>
+          <a:off x="0" y="0"/>
+          <a:ext cx="0" cy="0"/>
+          <a:chOff x="0" y="0"/>
+          <a:chExt cx="0" cy="0"/>
+        </a:xfrm>
+      </p:grpSpPr>
+      <p:sp>
+        <p:nvSpPr>
+          <p:cNvPr id="2" name="Header Placeholder 1"/>
+          <p:cNvSpPr>
+            <a:spLocks noGrp="1"/>
+          </p:cNvSpPr>
+          <p:nvPr>
+            <p:ph type="hdr" sz="quarter"/>
+          </p:nvPr>
+        </p:nvSpPr>
+        <p:spPr>
+          <a:xfrm>
+            <a:off x="0" y="0"/>
+            <a:ext cx="2971800" cy="458788"/>
+          </a:xfrm>
+          <a:prstGeom prst="rect">
+            <a:avLst/>
+          </a:prstGeom>
+        </p:spPr>
+        <p:txBody>
+          <a:bodyPr vert="horz" lIns="91440" tIns="45720" rIns="91440" bIns="45720" rtlCol="0"/>
+          <a:lstStyle>
+            <a:lvl1pPr algn="l">
+              <a:defRPr sz="1200"/>
+            </a:lvl1pPr>
+          </a:lstStyle>
+          <a:p>
+            <a:endParaRPr lang="en-SE"/>
+          </a:p>
+        </p:txBody>
+      </p:sp>
+      <p:sp>
+        <p:nvSpPr>
+          <p:cNvPr id="3" name="Date Placeholder 2"/>
+          <p:cNvSpPr>
+            <a:spLocks noGrp="1"/>
+          </p:cNvSpPr>
+          <p:nvPr>
+            <p:ph type="dt" idx="1"/>
+          </p:nvPr>
+        </p:nvSpPr>
+        <p:spPr>
+          <a:xfrm>
+            <a:off x="3884613" y="0"/>
+            <a:ext cx="2971800" cy="458788"/>
+          </a:xfrm>
+          <a:prstGeom prst="rect">
+            <a:avLst/>
+          </a:prstGeom>
+        </p:spPr>
+        <p:txBody>
+          <a:bodyPr vert="horz" lIns="91440" tIns="45720" rIns="91440" bIns="45720" rtlCol="0"/>
+          <a:lstStyle>
+            <a:lvl1pPr algn="r">
+              <a:defRPr sz="1200"/>
+            </a:lvl1pPr>
+          </a:lstStyle>
+          <a:p>
+            <a:fld id="{A591D268-DEFC-43D5-A116-FD0922DD73E3}" type="datetimeFigureOut">
+              <a:rPr lang="en-SE" smtClean="0"/>
+              <a:t>2020-10-23</a:t>
+            </a:fld>
+            <a:endParaRPr lang="en-SE"/>
+          </a:p>
+        </p:txBody>
+      </p:sp>
+      <p:sp>
+        <p:nvSpPr>
+          <p:cNvPr id="4" name="Slide Image Placeholder 3"/>
+          <p:cNvSpPr>
+            <a:spLocks noGrp="1" noRot="1" noChangeAspect="1"/>
+          </p:cNvSpPr>
+          <p:nvPr>
+            <p:ph type="sldImg" idx="2"/>
+          </p:nvPr>
+        </p:nvSpPr>
+        <p:spPr>
+          <a:xfrm>
+            <a:off x="685800" y="1143000"/>
+            <a:ext cx="5486400" cy="3086100"/>
+          </a:xfrm>
+          <a:prstGeom prst="rect">
+            <a:avLst/>
+          </a:prstGeom>
+          <a:noFill/>
+          <a:ln w="12700">
+            <a:solidFill>
+              <a:prstClr val="black"/>
+            </a:solidFill>
+          </a:ln>
+        </p:spPr>
+        <p:txBody>
+          <a:bodyPr vert="horz" lIns="91440" tIns="45720" rIns="91440" bIns="45720" rtlCol="0" anchor="ctr"/>
+          <a:lstStyle/>
+          <a:p>
+            <a:endParaRPr lang="en-SE"/>
+          </a:p>
+        </p:txBody>
+      </p:sp>
+      <p:sp>
+        <p:nvSpPr>
+          <p:cNvPr id="5" name="Notes Placeholder 4"/>
+          <p:cNvSpPr>
+            <a:spLocks noGrp="1"/>
+          </p:cNvSpPr>
+          <p:nvPr>
+            <p:ph type="body" sz="quarter" idx="3"/>
+          </p:nvPr>
+        </p:nvSpPr>
+        <p:spPr>
+          <a:xfrm>
+            <a:off x="685800" y="4400550"/>
+            <a:ext cx="5486400" cy="3600450"/>
+          </a:xfrm>
+          <a:prstGeom prst="rect">
+            <a:avLst/>
+          </a:prstGeom>
+        </p:spPr>
+        <p:txBody>
+          <a:bodyPr vert="horz" lIns="91440" tIns="45720" rIns="91440" bIns="45720" rtlCol="0"/>
+          <a:lstStyle/>
+          <a:p>
+            <a:pPr lvl="0"/>
+            <a:r>
+              <a:rPr lang="en-US"/>
+              <a:t>Click to edit Master text styles</a:t>
+            </a:r>
+          </a:p>
+          <a:p>
+            <a:pPr lvl="1"/>
+            <a:r>
+              <a:rPr lang="en-US"/>
+              <a:t>Second level</a:t>
+            </a:r>
+          </a:p>
+          <a:p>
+            <a:pPr lvl="2"/>
+            <a:r>
+              <a:rPr lang="en-US"/>
+              <a:t>Third level</a:t>
+            </a:r>
+          </a:p>
+          <a:p>
+            <a:pPr lvl="3"/>
+            <a:r>
+              <a:rPr lang="en-US"/>
+              <a:t>Fourth level</a:t>
+            </a:r>
+          </a:p>
+          <a:p>
+            <a:pPr lvl="4"/>
+            <a:r>
+              <a:rPr lang="en-US"/>
+              <a:t>Fifth level</a:t>
+            </a:r>
+            <a:endParaRPr lang="en-SE"/>
+          </a:p>
+        </p:txBody>
+      </p:sp>
+      <p:sp>
+        <p:nvSpPr>
+          <p:cNvPr id="6" name="Footer Placeholder 5"/>
+          <p:cNvSpPr>
+            <a:spLocks noGrp="1"/>
+          </p:cNvSpPr>
+          <p:nvPr>
+            <p:ph type="ftr" sz="quarter" idx="4"/>
+          </p:nvPr>
+        </p:nvSpPr>
+        <p:spPr>
+          <a:xfrm>
+            <a:off x="0" y="8685213"/>
+            <a:ext cx="2971800" cy="458787"/>
+          </a:xfrm>
+          <a:prstGeom prst="rect">
+            <a:avLst/>
+          </a:prstGeom>
+        </p:spPr>
+        <p:txBody>
+          <a:bodyPr vert="horz" lIns="91440" tIns="45720" rIns="91440" bIns="45720" rtlCol="0" anchor="b"/>
+          <a:lstStyle>
+            <a:lvl1pPr algn="l">
+              <a:defRPr sz="1200"/>
+            </a:lvl1pPr>
+          </a:lstStyle>
+          <a:p>
+            <a:endParaRPr lang="en-SE"/>
+          </a:p>
+        </p:txBody>
+      </p:sp>
+      <p:sp>
+        <p:nvSpPr>
+          <p:cNvPr id="7" name="Slide Number Placeholder 6"/>
+          <p:cNvSpPr>
+            <a:spLocks noGrp="1"/>
+          </p:cNvSpPr>
+          <p:nvPr>
+            <p:ph type="sldNum" sz="quarter" idx="5"/>
+          </p:nvPr>
+        </p:nvSpPr>
+        <p:spPr>
+          <a:xfrm>
+            <a:off x="3884613" y="8685213"/>
+            <a:ext cx="2971800" cy="458787"/>
+          </a:xfrm>
+          <a:prstGeom prst="rect">
+            <a:avLst/>
+          </a:prstGeom>
+        </p:spPr>
+        <p:txBody>
+          <a:bodyPr vert="horz" lIns="91440" tIns="45720" rIns="91440" bIns="45720" rtlCol="0" anchor="b"/>
+          <a:lstStyle>
+            <a:lvl1pPr algn="r">
+              <a:defRPr sz="1200"/>
+            </a:lvl1pPr>
+          </a:lstStyle>
+          <a:p>
+            <a:fld id="{1D543C36-DFAC-41A8-BE2D-915FCD4D1876}" type="slidenum">
+              <a:rPr lang="en-SE" smtClean="0"/>
+              <a:t>‹#›</a:t>
+            </a:fld>
+            <a:endParaRPr lang="en-SE"/>
+          </a:p>
+        </p:txBody>
+      </p:sp>
+    </p:spTree>
+    <p:extLst>
+      <p:ext uri="{BB962C8B-B14F-4D97-AF65-F5344CB8AC3E}">
+        <p14:creationId xmlns:p14="http://schemas.microsoft.com/office/powerpoint/2010/main" val="3992375121"/>
+      </p:ext>
+    </p:extLst>
+  </p:cSld>
+  <p:clrMap bg1="lt1" tx1="dk1" bg2="lt2" tx2="dk2" accent1="accent1" accent2="accent2" accent3="accent3" accent4="accent4" accent5="accent5" accent6="accent6" hlink="hlink" folHlink="folHlink"/>
+  <p:notesStyle>
+    <a:lvl1pPr marL="0" algn="l" defTabSz="914400" rtl="0" eaLnBrk="1" latinLnBrk="0" hangingPunct="1">
+      <a:defRPr sz="1200" kern="1200">
+        <a:solidFill>
+          <a:schemeClr val="tx1"/>
+        </a:solidFill>
+        <a:latin typeface="+mn-lt"/>
+        <a:ea typeface="+mn-ea"/>
+        <a:cs typeface="+mn-cs"/>
+      </a:defRPr>
+    </a:lvl1pPr>
+    <a:lvl2pPr marL="457200" algn="l" defTabSz="914400" rtl="0" eaLnBrk="1" latinLnBrk="0" hangingPunct="1">
+      <a:defRPr sz="1200" kern="1200">
+        <a:solidFill>
+          <a:schemeClr val="tx1"/>
+        </a:solidFill>
+        <a:latin typeface="+mn-lt"/>
+        <a:ea typeface="+mn-ea"/>
+        <a:cs typeface="+mn-cs"/>
+      </a:defRPr>
+    </a:lvl2pPr>
+    <a:lvl3pPr marL="914400" algn="l" defTabSz="914400" rtl="0" eaLnBrk="1" latinLnBrk="0" hangingPunct="1">
+      <a:defRPr sz="1200" kern="1200">
+        <a:solidFill>
+          <a:schemeClr val="tx1"/>
+        </a:solidFill>
+        <a:latin typeface="+mn-lt"/>
+        <a:ea typeface="+mn-ea"/>
+        <a:cs typeface="+mn-cs"/>
+      </a:defRPr>
+    </a:lvl3pPr>
+    <a:lvl4pPr marL="1371600" algn="l" defTabSz="914400" rtl="0" eaLnBrk="1" latinLnBrk="0" hangingPunct="1">
+      <a:defRPr sz="1200" kern="1200">
+        <a:solidFill>
+          <a:schemeClr val="tx1"/>
+        </a:solidFill>
+        <a:latin typeface="+mn-lt"/>
+        <a:ea typeface="+mn-ea"/>
+        <a:cs typeface="+mn-cs"/>
+      </a:defRPr>
+    </a:lvl4pPr>
+    <a:lvl5pPr marL="1828800" algn="l" defTabSz="914400" rtl="0" eaLnBrk="1" latinLnBrk="0" hangingPunct="1">
+      <a:defRPr sz="1200" kern="1200">
+        <a:solidFill>
+          <a:schemeClr val="tx1"/>
+        </a:solidFill>
+        <a:latin typeface="+mn-lt"/>
+        <a:ea typeface="+mn-ea"/>
+        <a:cs typeface="+mn-cs"/>
+      </a:defRPr>
+    </a:lvl5pPr>
+    <a:lvl6pPr marL="2286000" algn="l" defTabSz="914400" rtl="0" eaLnBrk="1" latinLnBrk="0" hangingPunct="1">
+      <a:defRPr sz="1200" kern="1200">
+        <a:solidFill>
+          <a:schemeClr val="tx1"/>
+        </a:solidFill>
+        <a:latin typeface="+mn-lt"/>
+        <a:ea typeface="+mn-ea"/>
+        <a:cs typeface="+mn-cs"/>
+      </a:defRPr>
+    </a:lvl6pPr>
+    <a:lvl7pPr marL="2743200" algn="l" defTabSz="914400" rtl="0" eaLnBrk="1" latinLnBrk="0" hangingPunct="1">
+      <a:defRPr sz="1200" kern="1200">
+        <a:solidFill>
+          <a:schemeClr val="tx1"/>
+        </a:solidFill>
+        <a:latin typeface="+mn-lt"/>
+        <a:ea typeface="+mn-ea"/>
+        <a:cs typeface="+mn-cs"/>
+      </a:defRPr>
+    </a:lvl7pPr>
+    <a:lvl8pPr marL="3200400" algn="l" defTabSz="914400" rtl="0" eaLnBrk="1" latinLnBrk="0" hangingPunct="1">
+      <a:defRPr sz="1200" kern="1200">
+        <a:solidFill>
+          <a:schemeClr val="tx1"/>
+        </a:solidFill>
+        <a:latin typeface="+mn-lt"/>
+        <a:ea typeface="+mn-ea"/>
+        <a:cs typeface="+mn-cs"/>
+      </a:defRPr>
+    </a:lvl8pPr>
+    <a:lvl9pPr marL="3657600" algn="l" defTabSz="914400" rtl="0" eaLnBrk="1" latinLnBrk="0" hangingPunct="1">
+      <a:defRPr sz="1200" kern="1200">
+        <a:solidFill>
+          <a:schemeClr val="tx1"/>
+        </a:solidFill>
+        <a:latin typeface="+mn-lt"/>
+        <a:ea typeface="+mn-ea"/>
+        <a:cs typeface="+mn-cs"/>
+      </a:defRPr>
+    </a:lvl9pPr>
+  </p:notesStyle>
+</p:notesMaster>
+</file>
+
 <file path=ppt/slideLayouts/slideLayout1.xml><?xml version="1.0" encoding="utf-8"?>
 <p:sldLayout xmlns:a="http://schemas.openxmlformats.org/drawingml/2006/main" xmlns:r="http://schemas.openxmlformats.org/officeDocument/2006/relationships" xmlns:p="http://schemas.openxmlformats.org/presentationml/2006/main" type="title" preserve="1">
   <p:cSld name="Title Slide">
@@ -153,7 +506,7 @@
           <p:cNvPr id="2" name="Title 1">
             <a:extLst>
               <a:ext uri="{FF2B5EF4-FFF2-40B4-BE49-F238E27FC236}">
-                <a16:creationId xmlns:a16="http://schemas.microsoft.com/office/drawing/2014/main" id="{65AA85AF-F046-48F1-B623-760E22E3F0D7}"/>
+                <a16:creationId xmlns:a16="http://schemas.microsoft.com/office/drawing/2014/main" id="{BAA4EEDC-AB70-41F4-BA93-19EAB2C7B12A}"/>
               </a:ext>
             </a:extLst>
           </p:cNvPr>
@@ -182,7 +535,7 @@
               <a:rPr lang="en-US"/>
               <a:t>Click to edit Master title style</a:t>
             </a:r>
-            <a:endParaRPr lang="sv-SE"/>
+            <a:endParaRPr lang="en-SE"/>
           </a:p>
         </p:txBody>
       </p:sp>
@@ -191,7 +544,7 @@
           <p:cNvPr id="3" name="Subtitle 2">
             <a:extLst>
               <a:ext uri="{FF2B5EF4-FFF2-40B4-BE49-F238E27FC236}">
-                <a16:creationId xmlns:a16="http://schemas.microsoft.com/office/drawing/2014/main" id="{A042FF24-B4B7-44E3-A466-26DB23AE8941}"/>
+                <a16:creationId xmlns:a16="http://schemas.microsoft.com/office/drawing/2014/main" id="{EDF51C4F-741E-44C5-8D1E-0F2F9D480525}"/>
               </a:ext>
             </a:extLst>
           </p:cNvPr>
@@ -253,7 +606,7 @@
               <a:rPr lang="en-US"/>
               <a:t>Click to edit Master subtitle style</a:t>
             </a:r>
-            <a:endParaRPr lang="sv-SE"/>
+            <a:endParaRPr lang="en-SE"/>
           </a:p>
         </p:txBody>
       </p:sp>
@@ -262,7 +615,7 @@
           <p:cNvPr id="4" name="Date Placeholder 3">
             <a:extLst>
               <a:ext uri="{FF2B5EF4-FFF2-40B4-BE49-F238E27FC236}">
-                <a16:creationId xmlns:a16="http://schemas.microsoft.com/office/drawing/2014/main" id="{7BDB2C8B-AC2B-47A3-8E0B-6C0D52C31BA7}"/>
+                <a16:creationId xmlns:a16="http://schemas.microsoft.com/office/drawing/2014/main" id="{1DE00BAE-2FFB-4312-A94B-4E929C27B411}"/>
               </a:ext>
             </a:extLst>
           </p:cNvPr>
@@ -280,7 +633,7 @@
           <a:p>
             <a:fld id="{D393A350-BAC2-46E8-98D7-627DAC8F078D}" type="datetimeFigureOut">
               <a:rPr lang="sv-SE" smtClean="0"/>
-              <a:t>2019-03-21</a:t>
+              <a:t>2020-10-23</a:t>
             </a:fld>
             <a:endParaRPr lang="sv-SE"/>
           </a:p>
@@ -291,7 +644,7 @@
           <p:cNvPr id="5" name="Footer Placeholder 4">
             <a:extLst>
               <a:ext uri="{FF2B5EF4-FFF2-40B4-BE49-F238E27FC236}">
-                <a16:creationId xmlns:a16="http://schemas.microsoft.com/office/drawing/2014/main" id="{DA4B480D-011B-41D9-AE54-2B7A39B9D2AD}"/>
+                <a16:creationId xmlns:a16="http://schemas.microsoft.com/office/drawing/2014/main" id="{E6F28CC1-2952-4C90-A465-0FA157FC6A74}"/>
               </a:ext>
             </a:extLst>
           </p:cNvPr>
@@ -316,7 +669,7 @@
           <p:cNvPr id="6" name="Slide Number Placeholder 5">
             <a:extLst>
               <a:ext uri="{FF2B5EF4-FFF2-40B4-BE49-F238E27FC236}">
-                <a16:creationId xmlns:a16="http://schemas.microsoft.com/office/drawing/2014/main" id="{480B3B87-5B46-44C8-9662-4A984FDA30AB}"/>
+                <a16:creationId xmlns:a16="http://schemas.microsoft.com/office/drawing/2014/main" id="{2DAB8F24-D33E-44CF-AAD7-C352D9BBF784}"/>
               </a:ext>
             </a:extLst>
           </p:cNvPr>
@@ -343,7 +696,7 @@
     </p:spTree>
     <p:extLst>
       <p:ext uri="{BB962C8B-B14F-4D97-AF65-F5344CB8AC3E}">
-        <p14:creationId xmlns:p14="http://schemas.microsoft.com/office/powerpoint/2010/main" val="1234977485"/>
+        <p14:creationId xmlns:p14="http://schemas.microsoft.com/office/powerpoint/2010/main" val="4155397864"/>
       </p:ext>
     </p:extLst>
   </p:cSld>
@@ -375,7 +728,7 @@
           <p:cNvPr id="2" name="Title 1">
             <a:extLst>
               <a:ext uri="{FF2B5EF4-FFF2-40B4-BE49-F238E27FC236}">
-                <a16:creationId xmlns:a16="http://schemas.microsoft.com/office/drawing/2014/main" id="{F0221682-D3D4-4B4A-BD43-9ECBB515F680}"/>
+                <a16:creationId xmlns:a16="http://schemas.microsoft.com/office/drawing/2014/main" id="{19E4F8B1-46D4-4309-82FE-A8DE234F0A0C}"/>
               </a:ext>
             </a:extLst>
           </p:cNvPr>
@@ -395,7 +748,7 @@
               <a:rPr lang="en-US"/>
               <a:t>Click to edit Master title style</a:t>
             </a:r>
-            <a:endParaRPr lang="sv-SE"/>
+            <a:endParaRPr lang="en-SE"/>
           </a:p>
         </p:txBody>
       </p:sp>
@@ -404,7 +757,7 @@
           <p:cNvPr id="3" name="Vertical Text Placeholder 2">
             <a:extLst>
               <a:ext uri="{FF2B5EF4-FFF2-40B4-BE49-F238E27FC236}">
-                <a16:creationId xmlns:a16="http://schemas.microsoft.com/office/drawing/2014/main" id="{138329F5-5680-4719-B74B-C6E0A5904B45}"/>
+                <a16:creationId xmlns:a16="http://schemas.microsoft.com/office/drawing/2014/main" id="{15B74076-47BE-4425-BD13-0940863BD3F2}"/>
               </a:ext>
             </a:extLst>
           </p:cNvPr>
@@ -423,7 +776,7 @@
             <a:pPr lvl="0"/>
             <a:r>
               <a:rPr lang="en-US"/>
-              <a:t>Edit Master text styles</a:t>
+              <a:t>Click to edit Master text styles</a:t>
             </a:r>
           </a:p>
           <a:p>
@@ -453,7 +806,7 @@
               <a:rPr lang="en-US"/>
               <a:t>Fifth level</a:t>
             </a:r>
-            <a:endParaRPr lang="sv-SE"/>
+            <a:endParaRPr lang="en-SE"/>
           </a:p>
         </p:txBody>
       </p:sp>
@@ -462,7 +815,7 @@
           <p:cNvPr id="4" name="Date Placeholder 3">
             <a:extLst>
               <a:ext uri="{FF2B5EF4-FFF2-40B4-BE49-F238E27FC236}">
-                <a16:creationId xmlns:a16="http://schemas.microsoft.com/office/drawing/2014/main" id="{7EB73801-E5EE-4569-9609-7F6722BBC4E8}"/>
+                <a16:creationId xmlns:a16="http://schemas.microsoft.com/office/drawing/2014/main" id="{879BE654-2220-479C-8DF8-2F9FD7F74C8B}"/>
               </a:ext>
             </a:extLst>
           </p:cNvPr>
@@ -480,7 +833,7 @@
           <a:p>
             <a:fld id="{D393A350-BAC2-46E8-98D7-627DAC8F078D}" type="datetimeFigureOut">
               <a:rPr lang="sv-SE" smtClean="0"/>
-              <a:t>2019-03-21</a:t>
+              <a:t>2020-10-23</a:t>
             </a:fld>
             <a:endParaRPr lang="sv-SE"/>
           </a:p>
@@ -491,7 +844,7 @@
           <p:cNvPr id="5" name="Footer Placeholder 4">
             <a:extLst>
               <a:ext uri="{FF2B5EF4-FFF2-40B4-BE49-F238E27FC236}">
-                <a16:creationId xmlns:a16="http://schemas.microsoft.com/office/drawing/2014/main" id="{7F6C70C2-94B3-48A9-B146-6EBFD4BFCEEB}"/>
+                <a16:creationId xmlns:a16="http://schemas.microsoft.com/office/drawing/2014/main" id="{3B0DE93D-2648-499C-A4A8-58ED79584ABC}"/>
               </a:ext>
             </a:extLst>
           </p:cNvPr>
@@ -516,7 +869,7 @@
           <p:cNvPr id="6" name="Slide Number Placeholder 5">
             <a:extLst>
               <a:ext uri="{FF2B5EF4-FFF2-40B4-BE49-F238E27FC236}">
-                <a16:creationId xmlns:a16="http://schemas.microsoft.com/office/drawing/2014/main" id="{6F5EAA53-FE41-4764-B8C4-69D8C99655B9}"/>
+                <a16:creationId xmlns:a16="http://schemas.microsoft.com/office/drawing/2014/main" id="{3BDFE6AB-2426-4093-ADDF-CD0616A780D7}"/>
               </a:ext>
             </a:extLst>
           </p:cNvPr>
@@ -543,7 +896,7 @@
     </p:spTree>
     <p:extLst>
       <p:ext uri="{BB962C8B-B14F-4D97-AF65-F5344CB8AC3E}">
-        <p14:creationId xmlns:p14="http://schemas.microsoft.com/office/powerpoint/2010/main" val="1311638332"/>
+        <p14:creationId xmlns:p14="http://schemas.microsoft.com/office/powerpoint/2010/main" val="3295652121"/>
       </p:ext>
     </p:extLst>
   </p:cSld>
@@ -575,7 +928,7 @@
           <p:cNvPr id="2" name="Vertical Title 1">
             <a:extLst>
               <a:ext uri="{FF2B5EF4-FFF2-40B4-BE49-F238E27FC236}">
-                <a16:creationId xmlns:a16="http://schemas.microsoft.com/office/drawing/2014/main" id="{512D8FC3-EFD2-4623-AC55-43D1EDE1A33C}"/>
+                <a16:creationId xmlns:a16="http://schemas.microsoft.com/office/drawing/2014/main" id="{C7429C86-7F03-4E9B-87A1-BEA586FFF0F4}"/>
               </a:ext>
             </a:extLst>
           </p:cNvPr>
@@ -600,7 +953,7 @@
               <a:rPr lang="en-US"/>
               <a:t>Click to edit Master title style</a:t>
             </a:r>
-            <a:endParaRPr lang="sv-SE"/>
+            <a:endParaRPr lang="en-SE"/>
           </a:p>
         </p:txBody>
       </p:sp>
@@ -609,7 +962,7 @@
           <p:cNvPr id="3" name="Vertical Text Placeholder 2">
             <a:extLst>
               <a:ext uri="{FF2B5EF4-FFF2-40B4-BE49-F238E27FC236}">
-                <a16:creationId xmlns:a16="http://schemas.microsoft.com/office/drawing/2014/main" id="{8FAD5B7B-EA0E-4EF4-9D98-73D52F648D02}"/>
+                <a16:creationId xmlns:a16="http://schemas.microsoft.com/office/drawing/2014/main" id="{DB6B7D68-892C-4CE8-A5C4-463192615D83}"/>
               </a:ext>
             </a:extLst>
           </p:cNvPr>
@@ -633,7 +986,7 @@
             <a:pPr lvl="0"/>
             <a:r>
               <a:rPr lang="en-US"/>
-              <a:t>Edit Master text styles</a:t>
+              <a:t>Click to edit Master text styles</a:t>
             </a:r>
           </a:p>
           <a:p>
@@ -663,7 +1016,7 @@
               <a:rPr lang="en-US"/>
               <a:t>Fifth level</a:t>
             </a:r>
-            <a:endParaRPr lang="sv-SE"/>
+            <a:endParaRPr lang="en-SE"/>
           </a:p>
         </p:txBody>
       </p:sp>
@@ -672,7 +1025,7 @@
           <p:cNvPr id="4" name="Date Placeholder 3">
             <a:extLst>
               <a:ext uri="{FF2B5EF4-FFF2-40B4-BE49-F238E27FC236}">
-                <a16:creationId xmlns:a16="http://schemas.microsoft.com/office/drawing/2014/main" id="{B48B94DF-3453-465E-B035-46F7E0ECC58E}"/>
+                <a16:creationId xmlns:a16="http://schemas.microsoft.com/office/drawing/2014/main" id="{C9A35952-2F8B-41A9-A6B9-26BB6B56546E}"/>
               </a:ext>
             </a:extLst>
           </p:cNvPr>
@@ -690,7 +1043,7 @@
           <a:p>
             <a:fld id="{D393A350-BAC2-46E8-98D7-627DAC8F078D}" type="datetimeFigureOut">
               <a:rPr lang="sv-SE" smtClean="0"/>
-              <a:t>2019-03-21</a:t>
+              <a:t>2020-10-23</a:t>
             </a:fld>
             <a:endParaRPr lang="sv-SE"/>
           </a:p>
@@ -701,7 +1054,7 @@
           <p:cNvPr id="5" name="Footer Placeholder 4">
             <a:extLst>
               <a:ext uri="{FF2B5EF4-FFF2-40B4-BE49-F238E27FC236}">
-                <a16:creationId xmlns:a16="http://schemas.microsoft.com/office/drawing/2014/main" id="{72D038A9-2076-4C4C-8396-E1E4C0454F71}"/>
+                <a16:creationId xmlns:a16="http://schemas.microsoft.com/office/drawing/2014/main" id="{04581969-5C3C-4625-AAE9-8169C397DD97}"/>
               </a:ext>
             </a:extLst>
           </p:cNvPr>
@@ -726,7 +1079,7 @@
           <p:cNvPr id="6" name="Slide Number Placeholder 5">
             <a:extLst>
               <a:ext uri="{FF2B5EF4-FFF2-40B4-BE49-F238E27FC236}">
-                <a16:creationId xmlns:a16="http://schemas.microsoft.com/office/drawing/2014/main" id="{2F596D57-8073-4251-AD20-23A038A592FE}"/>
+                <a16:creationId xmlns:a16="http://schemas.microsoft.com/office/drawing/2014/main" id="{8043DCEE-5FA1-4258-814A-17FCA96543F9}"/>
               </a:ext>
             </a:extLst>
           </p:cNvPr>
@@ -753,7 +1106,7 @@
     </p:spTree>
     <p:extLst>
       <p:ext uri="{BB962C8B-B14F-4D97-AF65-F5344CB8AC3E}">
-        <p14:creationId xmlns:p14="http://schemas.microsoft.com/office/powerpoint/2010/main" val="4136664725"/>
+        <p14:creationId xmlns:p14="http://schemas.microsoft.com/office/powerpoint/2010/main" val="2599289014"/>
       </p:ext>
     </p:extLst>
   </p:cSld>
@@ -785,7 +1138,7 @@
           <p:cNvPr id="2" name="Title 1">
             <a:extLst>
               <a:ext uri="{FF2B5EF4-FFF2-40B4-BE49-F238E27FC236}">
-                <a16:creationId xmlns:a16="http://schemas.microsoft.com/office/drawing/2014/main" id="{BEEE6D89-7427-4DF0-8291-8A0BCC9CD6E8}"/>
+                <a16:creationId xmlns:a16="http://schemas.microsoft.com/office/drawing/2014/main" id="{D0AD8619-A646-49E6-9273-455CBAB3A6B6}"/>
               </a:ext>
             </a:extLst>
           </p:cNvPr>
@@ -805,7 +1158,7 @@
               <a:rPr lang="en-US"/>
               <a:t>Click to edit Master title style</a:t>
             </a:r>
-            <a:endParaRPr lang="sv-SE"/>
+            <a:endParaRPr lang="en-SE"/>
           </a:p>
         </p:txBody>
       </p:sp>
@@ -814,7 +1167,7 @@
           <p:cNvPr id="3" name="Content Placeholder 2">
             <a:extLst>
               <a:ext uri="{FF2B5EF4-FFF2-40B4-BE49-F238E27FC236}">
-                <a16:creationId xmlns:a16="http://schemas.microsoft.com/office/drawing/2014/main" id="{9757423F-29E5-45BD-95A9-93BBF2DDDCA6}"/>
+                <a16:creationId xmlns:a16="http://schemas.microsoft.com/office/drawing/2014/main" id="{478263B6-7C3E-4826-A952-58EDFC90BE15}"/>
               </a:ext>
             </a:extLst>
           </p:cNvPr>
@@ -833,7 +1186,7 @@
             <a:pPr lvl="0"/>
             <a:r>
               <a:rPr lang="en-US"/>
-              <a:t>Edit Master text styles</a:t>
+              <a:t>Click to edit Master text styles</a:t>
             </a:r>
           </a:p>
           <a:p>
@@ -863,7 +1216,7 @@
               <a:rPr lang="en-US"/>
               <a:t>Fifth level</a:t>
             </a:r>
-            <a:endParaRPr lang="sv-SE"/>
+            <a:endParaRPr lang="en-SE"/>
           </a:p>
         </p:txBody>
       </p:sp>
@@ -872,7 +1225,7 @@
           <p:cNvPr id="4" name="Date Placeholder 3">
             <a:extLst>
               <a:ext uri="{FF2B5EF4-FFF2-40B4-BE49-F238E27FC236}">
-                <a16:creationId xmlns:a16="http://schemas.microsoft.com/office/drawing/2014/main" id="{93FD883F-1A65-4C56-9FEB-318C6CCC4462}"/>
+                <a16:creationId xmlns:a16="http://schemas.microsoft.com/office/drawing/2014/main" id="{15F362E4-B43C-4064-AF21-F9F59D336B4A}"/>
               </a:ext>
             </a:extLst>
           </p:cNvPr>
@@ -890,7 +1243,7 @@
           <a:p>
             <a:fld id="{D393A350-BAC2-46E8-98D7-627DAC8F078D}" type="datetimeFigureOut">
               <a:rPr lang="sv-SE" smtClean="0"/>
-              <a:t>2019-03-21</a:t>
+              <a:t>2020-10-23</a:t>
             </a:fld>
             <a:endParaRPr lang="sv-SE"/>
           </a:p>
@@ -901,7 +1254,7 @@
           <p:cNvPr id="5" name="Footer Placeholder 4">
             <a:extLst>
               <a:ext uri="{FF2B5EF4-FFF2-40B4-BE49-F238E27FC236}">
-                <a16:creationId xmlns:a16="http://schemas.microsoft.com/office/drawing/2014/main" id="{A7491021-6937-4113-A8C1-A7E3071EAE62}"/>
+                <a16:creationId xmlns:a16="http://schemas.microsoft.com/office/drawing/2014/main" id="{52A6C663-0C71-4E3E-8F3A-A03F2A04C8A4}"/>
               </a:ext>
             </a:extLst>
           </p:cNvPr>
@@ -926,7 +1279,7 @@
           <p:cNvPr id="6" name="Slide Number Placeholder 5">
             <a:extLst>
               <a:ext uri="{FF2B5EF4-FFF2-40B4-BE49-F238E27FC236}">
-                <a16:creationId xmlns:a16="http://schemas.microsoft.com/office/drawing/2014/main" id="{8D642E24-6592-4AE2-84E9-F411F4D867F5}"/>
+                <a16:creationId xmlns:a16="http://schemas.microsoft.com/office/drawing/2014/main" id="{0B333877-5F11-4955-9B84-75738D013ECE}"/>
               </a:ext>
             </a:extLst>
           </p:cNvPr>
@@ -953,7 +1306,7 @@
     </p:spTree>
     <p:extLst>
       <p:ext uri="{BB962C8B-B14F-4D97-AF65-F5344CB8AC3E}">
-        <p14:creationId xmlns:p14="http://schemas.microsoft.com/office/powerpoint/2010/main" val="649134682"/>
+        <p14:creationId xmlns:p14="http://schemas.microsoft.com/office/powerpoint/2010/main" val="3011201689"/>
       </p:ext>
     </p:extLst>
   </p:cSld>
@@ -985,7 +1338,7 @@
           <p:cNvPr id="2" name="Title 1">
             <a:extLst>
               <a:ext uri="{FF2B5EF4-FFF2-40B4-BE49-F238E27FC236}">
-                <a16:creationId xmlns:a16="http://schemas.microsoft.com/office/drawing/2014/main" id="{1889EE8B-6F3B-4E4C-AF31-F005403E6F92}"/>
+                <a16:creationId xmlns:a16="http://schemas.microsoft.com/office/drawing/2014/main" id="{08C14544-5A39-4AE9-80AC-E7A713F50DD8}"/>
               </a:ext>
             </a:extLst>
           </p:cNvPr>
@@ -1014,7 +1367,7 @@
               <a:rPr lang="en-US"/>
               <a:t>Click to edit Master title style</a:t>
             </a:r>
-            <a:endParaRPr lang="sv-SE"/>
+            <a:endParaRPr lang="en-SE"/>
           </a:p>
         </p:txBody>
       </p:sp>
@@ -1023,7 +1376,7 @@
           <p:cNvPr id="3" name="Text Placeholder 2">
             <a:extLst>
               <a:ext uri="{FF2B5EF4-FFF2-40B4-BE49-F238E27FC236}">
-                <a16:creationId xmlns:a16="http://schemas.microsoft.com/office/drawing/2014/main" id="{56FF96AD-D3E9-4941-8B7F-7266E7E9710F}"/>
+                <a16:creationId xmlns:a16="http://schemas.microsoft.com/office/drawing/2014/main" id="{FBC8A77A-3449-4E52-9AB0-30EE424C8CE0}"/>
               </a:ext>
             </a:extLst>
           </p:cNvPr>
@@ -1138,7 +1491,7 @@
             <a:pPr lvl="0"/>
             <a:r>
               <a:rPr lang="en-US"/>
-              <a:t>Edit Master text styles</a:t>
+              <a:t>Click to edit Master text styles</a:t>
             </a:r>
           </a:p>
         </p:txBody>
@@ -1148,7 +1501,7 @@
           <p:cNvPr id="4" name="Date Placeholder 3">
             <a:extLst>
               <a:ext uri="{FF2B5EF4-FFF2-40B4-BE49-F238E27FC236}">
-                <a16:creationId xmlns:a16="http://schemas.microsoft.com/office/drawing/2014/main" id="{C161FA7B-CE9D-4DAA-980A-E9C4A966F654}"/>
+                <a16:creationId xmlns:a16="http://schemas.microsoft.com/office/drawing/2014/main" id="{6CBB56F2-5257-40E5-8A0B-F82AEF301846}"/>
               </a:ext>
             </a:extLst>
           </p:cNvPr>
@@ -1166,7 +1519,7 @@
           <a:p>
             <a:fld id="{D393A350-BAC2-46E8-98D7-627DAC8F078D}" type="datetimeFigureOut">
               <a:rPr lang="sv-SE" smtClean="0"/>
-              <a:t>2019-03-21</a:t>
+              <a:t>2020-10-23</a:t>
             </a:fld>
             <a:endParaRPr lang="sv-SE"/>
           </a:p>
@@ -1177,7 +1530,7 @@
           <p:cNvPr id="5" name="Footer Placeholder 4">
             <a:extLst>
               <a:ext uri="{FF2B5EF4-FFF2-40B4-BE49-F238E27FC236}">
-                <a16:creationId xmlns:a16="http://schemas.microsoft.com/office/drawing/2014/main" id="{845F8CB3-B3AF-4739-BCC9-DD178C91AE9C}"/>
+                <a16:creationId xmlns:a16="http://schemas.microsoft.com/office/drawing/2014/main" id="{B4132397-E628-4F20-A517-E72E254636F0}"/>
               </a:ext>
             </a:extLst>
           </p:cNvPr>
@@ -1202,7 +1555,7 @@
           <p:cNvPr id="6" name="Slide Number Placeholder 5">
             <a:extLst>
               <a:ext uri="{FF2B5EF4-FFF2-40B4-BE49-F238E27FC236}">
-                <a16:creationId xmlns:a16="http://schemas.microsoft.com/office/drawing/2014/main" id="{5D831094-72AB-4985-B413-197F36EE7787}"/>
+                <a16:creationId xmlns:a16="http://schemas.microsoft.com/office/drawing/2014/main" id="{49BA4224-74D2-451E-B506-E1905DF99523}"/>
               </a:ext>
             </a:extLst>
           </p:cNvPr>
@@ -1229,7 +1582,7 @@
     </p:spTree>
     <p:extLst>
       <p:ext uri="{BB962C8B-B14F-4D97-AF65-F5344CB8AC3E}">
-        <p14:creationId xmlns:p14="http://schemas.microsoft.com/office/powerpoint/2010/main" val="1727015247"/>
+        <p14:creationId xmlns:p14="http://schemas.microsoft.com/office/powerpoint/2010/main" val="4230792868"/>
       </p:ext>
     </p:extLst>
   </p:cSld>
@@ -1261,7 +1614,7 @@
           <p:cNvPr id="2" name="Title 1">
             <a:extLst>
               <a:ext uri="{FF2B5EF4-FFF2-40B4-BE49-F238E27FC236}">
-                <a16:creationId xmlns:a16="http://schemas.microsoft.com/office/drawing/2014/main" id="{02FEFDF3-DC55-48F2-90BC-C5667D5798E0}"/>
+                <a16:creationId xmlns:a16="http://schemas.microsoft.com/office/drawing/2014/main" id="{1C6B564E-5411-4C0A-B688-29E657905017}"/>
               </a:ext>
             </a:extLst>
           </p:cNvPr>
@@ -1281,7 +1634,7 @@
               <a:rPr lang="en-US"/>
               <a:t>Click to edit Master title style</a:t>
             </a:r>
-            <a:endParaRPr lang="sv-SE"/>
+            <a:endParaRPr lang="en-SE"/>
           </a:p>
         </p:txBody>
       </p:sp>
@@ -1290,7 +1643,7 @@
           <p:cNvPr id="3" name="Content Placeholder 2">
             <a:extLst>
               <a:ext uri="{FF2B5EF4-FFF2-40B4-BE49-F238E27FC236}">
-                <a16:creationId xmlns:a16="http://schemas.microsoft.com/office/drawing/2014/main" id="{42264152-FF42-4135-8C8D-765B9601255A}"/>
+                <a16:creationId xmlns:a16="http://schemas.microsoft.com/office/drawing/2014/main" id="{4F998969-1C9C-492D-A843-9740E760CBF6}"/>
               </a:ext>
             </a:extLst>
           </p:cNvPr>
@@ -1314,7 +1667,7 @@
             <a:pPr lvl="0"/>
             <a:r>
               <a:rPr lang="en-US"/>
-              <a:t>Edit Master text styles</a:t>
+              <a:t>Click to edit Master text styles</a:t>
             </a:r>
           </a:p>
           <a:p>
@@ -1344,7 +1697,7 @@
               <a:rPr lang="en-US"/>
               <a:t>Fifth level</a:t>
             </a:r>
-            <a:endParaRPr lang="sv-SE"/>
+            <a:endParaRPr lang="en-SE"/>
           </a:p>
         </p:txBody>
       </p:sp>
@@ -1353,7 +1706,7 @@
           <p:cNvPr id="4" name="Content Placeholder 3">
             <a:extLst>
               <a:ext uri="{FF2B5EF4-FFF2-40B4-BE49-F238E27FC236}">
-                <a16:creationId xmlns:a16="http://schemas.microsoft.com/office/drawing/2014/main" id="{1A5C09B6-B501-41B6-A1AA-EFFCE20CD3D0}"/>
+                <a16:creationId xmlns:a16="http://schemas.microsoft.com/office/drawing/2014/main" id="{E97AFD27-9AF3-4C9E-80DE-1A45E9096BCA}"/>
               </a:ext>
             </a:extLst>
           </p:cNvPr>
@@ -1377,7 +1730,7 @@
             <a:pPr lvl="0"/>
             <a:r>
               <a:rPr lang="en-US"/>
-              <a:t>Edit Master text styles</a:t>
+              <a:t>Click to edit Master text styles</a:t>
             </a:r>
           </a:p>
           <a:p>
@@ -1407,7 +1760,7 @@
               <a:rPr lang="en-US"/>
               <a:t>Fifth level</a:t>
             </a:r>
-            <a:endParaRPr lang="sv-SE"/>
+            <a:endParaRPr lang="en-SE"/>
           </a:p>
         </p:txBody>
       </p:sp>
@@ -1416,7 +1769,7 @@
           <p:cNvPr id="5" name="Date Placeholder 4">
             <a:extLst>
               <a:ext uri="{FF2B5EF4-FFF2-40B4-BE49-F238E27FC236}">
-                <a16:creationId xmlns:a16="http://schemas.microsoft.com/office/drawing/2014/main" id="{ED9B520A-5761-4DFD-AF57-1C5B66BC97CA}"/>
+                <a16:creationId xmlns:a16="http://schemas.microsoft.com/office/drawing/2014/main" id="{99D17588-70A9-46FB-9609-2F75C11BE6DE}"/>
               </a:ext>
             </a:extLst>
           </p:cNvPr>
@@ -1434,7 +1787,7 @@
           <a:p>
             <a:fld id="{D393A350-BAC2-46E8-98D7-627DAC8F078D}" type="datetimeFigureOut">
               <a:rPr lang="sv-SE" smtClean="0"/>
-              <a:t>2019-03-21</a:t>
+              <a:t>2020-10-23</a:t>
             </a:fld>
             <a:endParaRPr lang="sv-SE"/>
           </a:p>
@@ -1445,7 +1798,7 @@
           <p:cNvPr id="6" name="Footer Placeholder 5">
             <a:extLst>
               <a:ext uri="{FF2B5EF4-FFF2-40B4-BE49-F238E27FC236}">
-                <a16:creationId xmlns:a16="http://schemas.microsoft.com/office/drawing/2014/main" id="{24899AF6-8C25-4B06-B1A6-E9F4C8C8D79B}"/>
+                <a16:creationId xmlns:a16="http://schemas.microsoft.com/office/drawing/2014/main" id="{033CDA57-4849-44E9-86B0-C48CF8887717}"/>
               </a:ext>
             </a:extLst>
           </p:cNvPr>
@@ -1470,7 +1823,7 @@
           <p:cNvPr id="7" name="Slide Number Placeholder 6">
             <a:extLst>
               <a:ext uri="{FF2B5EF4-FFF2-40B4-BE49-F238E27FC236}">
-                <a16:creationId xmlns:a16="http://schemas.microsoft.com/office/drawing/2014/main" id="{130766AC-C5DB-4F37-A0E4-9292C92757F5}"/>
+                <a16:creationId xmlns:a16="http://schemas.microsoft.com/office/drawing/2014/main" id="{F915552F-9012-44EE-857E-E6B2A4AF693F}"/>
               </a:ext>
             </a:extLst>
           </p:cNvPr>
@@ -1497,7 +1850,7 @@
     </p:spTree>
     <p:extLst>
       <p:ext uri="{BB962C8B-B14F-4D97-AF65-F5344CB8AC3E}">
-        <p14:creationId xmlns:p14="http://schemas.microsoft.com/office/powerpoint/2010/main" val="4096258704"/>
+        <p14:creationId xmlns:p14="http://schemas.microsoft.com/office/powerpoint/2010/main" val="602516784"/>
       </p:ext>
     </p:extLst>
   </p:cSld>
@@ -1529,7 +1882,7 @@
           <p:cNvPr id="2" name="Title 1">
             <a:extLst>
               <a:ext uri="{FF2B5EF4-FFF2-40B4-BE49-F238E27FC236}">
-                <a16:creationId xmlns:a16="http://schemas.microsoft.com/office/drawing/2014/main" id="{2971B037-B540-4D29-AE3A-CF0DFE9CC459}"/>
+                <a16:creationId xmlns:a16="http://schemas.microsoft.com/office/drawing/2014/main" id="{E22971E2-7161-4082-B898-E028D3B3B50E}"/>
               </a:ext>
             </a:extLst>
           </p:cNvPr>
@@ -1554,7 +1907,7 @@
               <a:rPr lang="en-US"/>
               <a:t>Click to edit Master title style</a:t>
             </a:r>
-            <a:endParaRPr lang="sv-SE"/>
+            <a:endParaRPr lang="en-SE"/>
           </a:p>
         </p:txBody>
       </p:sp>
@@ -1563,7 +1916,7 @@
           <p:cNvPr id="3" name="Text Placeholder 2">
             <a:extLst>
               <a:ext uri="{FF2B5EF4-FFF2-40B4-BE49-F238E27FC236}">
-                <a16:creationId xmlns:a16="http://schemas.microsoft.com/office/drawing/2014/main" id="{F10C13E3-469E-4759-9B97-3E9A34C8A260}"/>
+                <a16:creationId xmlns:a16="http://schemas.microsoft.com/office/drawing/2014/main" id="{B54EBC68-93EE-4266-96E9-C3FD203FA134}"/>
               </a:ext>
             </a:extLst>
           </p:cNvPr>
@@ -1624,7 +1977,7 @@
             <a:pPr lvl="0"/>
             <a:r>
               <a:rPr lang="en-US"/>
-              <a:t>Edit Master text styles</a:t>
+              <a:t>Click to edit Master text styles</a:t>
             </a:r>
           </a:p>
         </p:txBody>
@@ -1634,7 +1987,7 @@
           <p:cNvPr id="4" name="Content Placeholder 3">
             <a:extLst>
               <a:ext uri="{FF2B5EF4-FFF2-40B4-BE49-F238E27FC236}">
-                <a16:creationId xmlns:a16="http://schemas.microsoft.com/office/drawing/2014/main" id="{169150EF-C9A5-4F65-B9E4-64A6E2BA174C}"/>
+                <a16:creationId xmlns:a16="http://schemas.microsoft.com/office/drawing/2014/main" id="{D8CCEDDA-4E66-4C19-AA19-410698375BBB}"/>
               </a:ext>
             </a:extLst>
           </p:cNvPr>
@@ -1658,7 +2011,7 @@
             <a:pPr lvl="0"/>
             <a:r>
               <a:rPr lang="en-US"/>
-              <a:t>Edit Master text styles</a:t>
+              <a:t>Click to edit Master text styles</a:t>
             </a:r>
           </a:p>
           <a:p>
@@ -1688,7 +2041,7 @@
               <a:rPr lang="en-US"/>
               <a:t>Fifth level</a:t>
             </a:r>
-            <a:endParaRPr lang="sv-SE"/>
+            <a:endParaRPr lang="en-SE"/>
           </a:p>
         </p:txBody>
       </p:sp>
@@ -1697,7 +2050,7 @@
           <p:cNvPr id="5" name="Text Placeholder 4">
             <a:extLst>
               <a:ext uri="{FF2B5EF4-FFF2-40B4-BE49-F238E27FC236}">
-                <a16:creationId xmlns:a16="http://schemas.microsoft.com/office/drawing/2014/main" id="{1B476ED6-00ED-4D40-BBE2-35E4E2CB16F2}"/>
+                <a16:creationId xmlns:a16="http://schemas.microsoft.com/office/drawing/2014/main" id="{8FCF26A2-D2E3-4552-8971-89B949616C28}"/>
               </a:ext>
             </a:extLst>
           </p:cNvPr>
@@ -1758,7 +2111,7 @@
             <a:pPr lvl="0"/>
             <a:r>
               <a:rPr lang="en-US"/>
-              <a:t>Edit Master text styles</a:t>
+              <a:t>Click to edit Master text styles</a:t>
             </a:r>
           </a:p>
         </p:txBody>
@@ -1768,7 +2121,7 @@
           <p:cNvPr id="6" name="Content Placeholder 5">
             <a:extLst>
               <a:ext uri="{FF2B5EF4-FFF2-40B4-BE49-F238E27FC236}">
-                <a16:creationId xmlns:a16="http://schemas.microsoft.com/office/drawing/2014/main" id="{1F853879-03CF-4181-B994-802D041C2279}"/>
+                <a16:creationId xmlns:a16="http://schemas.microsoft.com/office/drawing/2014/main" id="{5AA8DF4C-8316-466E-AD13-F6EBED3116D8}"/>
               </a:ext>
             </a:extLst>
           </p:cNvPr>
@@ -1792,7 +2145,7 @@
             <a:pPr lvl="0"/>
             <a:r>
               <a:rPr lang="en-US"/>
-              <a:t>Edit Master text styles</a:t>
+              <a:t>Click to edit Master text styles</a:t>
             </a:r>
           </a:p>
           <a:p>
@@ -1822,7 +2175,7 @@
               <a:rPr lang="en-US"/>
               <a:t>Fifth level</a:t>
             </a:r>
-            <a:endParaRPr lang="sv-SE"/>
+            <a:endParaRPr lang="en-SE"/>
           </a:p>
         </p:txBody>
       </p:sp>
@@ -1831,7 +2184,7 @@
           <p:cNvPr id="7" name="Date Placeholder 6">
             <a:extLst>
               <a:ext uri="{FF2B5EF4-FFF2-40B4-BE49-F238E27FC236}">
-                <a16:creationId xmlns:a16="http://schemas.microsoft.com/office/drawing/2014/main" id="{221CB4F3-74ED-4FB1-9FA6-857915D54A5D}"/>
+                <a16:creationId xmlns:a16="http://schemas.microsoft.com/office/drawing/2014/main" id="{D8AFE5FF-60C1-4B03-B667-0802AABE2768}"/>
               </a:ext>
             </a:extLst>
           </p:cNvPr>
@@ -1849,7 +2202,7 @@
           <a:p>
             <a:fld id="{D393A350-BAC2-46E8-98D7-627DAC8F078D}" type="datetimeFigureOut">
               <a:rPr lang="sv-SE" smtClean="0"/>
-              <a:t>2019-03-21</a:t>
+              <a:t>2020-10-23</a:t>
             </a:fld>
             <a:endParaRPr lang="sv-SE"/>
           </a:p>
@@ -1860,7 +2213,7 @@
           <p:cNvPr id="8" name="Footer Placeholder 7">
             <a:extLst>
               <a:ext uri="{FF2B5EF4-FFF2-40B4-BE49-F238E27FC236}">
-                <a16:creationId xmlns:a16="http://schemas.microsoft.com/office/drawing/2014/main" id="{008CD784-85CD-4496-A3FA-32BA03DD14F6}"/>
+                <a16:creationId xmlns:a16="http://schemas.microsoft.com/office/drawing/2014/main" id="{5F773564-EF65-4B06-A751-A641C548BFF4}"/>
               </a:ext>
             </a:extLst>
           </p:cNvPr>
@@ -1885,7 +2238,7 @@
           <p:cNvPr id="9" name="Slide Number Placeholder 8">
             <a:extLst>
               <a:ext uri="{FF2B5EF4-FFF2-40B4-BE49-F238E27FC236}">
-                <a16:creationId xmlns:a16="http://schemas.microsoft.com/office/drawing/2014/main" id="{DC8FA5D3-66E5-4538-8893-0885CA010450}"/>
+                <a16:creationId xmlns:a16="http://schemas.microsoft.com/office/drawing/2014/main" id="{07375AA7-0FAE-4EF9-8019-27DBBC5D6FD5}"/>
               </a:ext>
             </a:extLst>
           </p:cNvPr>
@@ -1912,7 +2265,7 @@
     </p:spTree>
     <p:extLst>
       <p:ext uri="{BB962C8B-B14F-4D97-AF65-F5344CB8AC3E}">
-        <p14:creationId xmlns:p14="http://schemas.microsoft.com/office/powerpoint/2010/main" val="214072040"/>
+        <p14:creationId xmlns:p14="http://schemas.microsoft.com/office/powerpoint/2010/main" val="3190092619"/>
       </p:ext>
     </p:extLst>
   </p:cSld>
@@ -1944,7 +2297,7 @@
           <p:cNvPr id="2" name="Title 1">
             <a:extLst>
               <a:ext uri="{FF2B5EF4-FFF2-40B4-BE49-F238E27FC236}">
-                <a16:creationId xmlns:a16="http://schemas.microsoft.com/office/drawing/2014/main" id="{3CB51D3C-12F6-4CAD-941F-8E60AF2379BA}"/>
+                <a16:creationId xmlns:a16="http://schemas.microsoft.com/office/drawing/2014/main" id="{957A9D6F-5B9A-4BCA-B76D-8873C1151D2C}"/>
               </a:ext>
             </a:extLst>
           </p:cNvPr>
@@ -1964,7 +2317,7 @@
               <a:rPr lang="en-US"/>
               <a:t>Click to edit Master title style</a:t>
             </a:r>
-            <a:endParaRPr lang="sv-SE"/>
+            <a:endParaRPr lang="en-SE"/>
           </a:p>
         </p:txBody>
       </p:sp>
@@ -1973,7 +2326,7 @@
           <p:cNvPr id="3" name="Date Placeholder 2">
             <a:extLst>
               <a:ext uri="{FF2B5EF4-FFF2-40B4-BE49-F238E27FC236}">
-                <a16:creationId xmlns:a16="http://schemas.microsoft.com/office/drawing/2014/main" id="{E5251475-E743-45EB-BC16-894FDE5DC8B5}"/>
+                <a16:creationId xmlns:a16="http://schemas.microsoft.com/office/drawing/2014/main" id="{B843A022-B2BD-4440-AD36-64094E68117B}"/>
               </a:ext>
             </a:extLst>
           </p:cNvPr>
@@ -1991,7 +2344,7 @@
           <a:p>
             <a:fld id="{D393A350-BAC2-46E8-98D7-627DAC8F078D}" type="datetimeFigureOut">
               <a:rPr lang="sv-SE" smtClean="0"/>
-              <a:t>2019-03-21</a:t>
+              <a:t>2020-10-23</a:t>
             </a:fld>
             <a:endParaRPr lang="sv-SE"/>
           </a:p>
@@ -2002,7 +2355,7 @@
           <p:cNvPr id="4" name="Footer Placeholder 3">
             <a:extLst>
               <a:ext uri="{FF2B5EF4-FFF2-40B4-BE49-F238E27FC236}">
-                <a16:creationId xmlns:a16="http://schemas.microsoft.com/office/drawing/2014/main" id="{E14BB9F6-5246-4B5C-811B-09DC161FF514}"/>
+                <a16:creationId xmlns:a16="http://schemas.microsoft.com/office/drawing/2014/main" id="{58764A5E-8A2A-469F-8123-9B0E6517CDC8}"/>
               </a:ext>
             </a:extLst>
           </p:cNvPr>
@@ -2027,7 +2380,7 @@
           <p:cNvPr id="5" name="Slide Number Placeholder 4">
             <a:extLst>
               <a:ext uri="{FF2B5EF4-FFF2-40B4-BE49-F238E27FC236}">
-                <a16:creationId xmlns:a16="http://schemas.microsoft.com/office/drawing/2014/main" id="{33A27070-D950-4BB9-A4F4-6336F5A8A8DA}"/>
+                <a16:creationId xmlns:a16="http://schemas.microsoft.com/office/drawing/2014/main" id="{1B35B1E0-0388-4F67-A2C3-DA6BA652D4BB}"/>
               </a:ext>
             </a:extLst>
           </p:cNvPr>
@@ -2054,7 +2407,7 @@
     </p:spTree>
     <p:extLst>
       <p:ext uri="{BB962C8B-B14F-4D97-AF65-F5344CB8AC3E}">
-        <p14:creationId xmlns:p14="http://schemas.microsoft.com/office/powerpoint/2010/main" val="948961288"/>
+        <p14:creationId xmlns:p14="http://schemas.microsoft.com/office/powerpoint/2010/main" val="643473492"/>
       </p:ext>
     </p:extLst>
   </p:cSld>
@@ -2086,7 +2439,7 @@
           <p:cNvPr id="2" name="Date Placeholder 1">
             <a:extLst>
               <a:ext uri="{FF2B5EF4-FFF2-40B4-BE49-F238E27FC236}">
-                <a16:creationId xmlns:a16="http://schemas.microsoft.com/office/drawing/2014/main" id="{4E419D0C-9AA8-4797-A59B-FCA031640CA6}"/>
+                <a16:creationId xmlns:a16="http://schemas.microsoft.com/office/drawing/2014/main" id="{6227BDFE-97D3-440F-80A1-379C85829336}"/>
               </a:ext>
             </a:extLst>
           </p:cNvPr>
@@ -2104,7 +2457,7 @@
           <a:p>
             <a:fld id="{D393A350-BAC2-46E8-98D7-627DAC8F078D}" type="datetimeFigureOut">
               <a:rPr lang="sv-SE" smtClean="0"/>
-              <a:t>2019-03-21</a:t>
+              <a:t>2020-10-23</a:t>
             </a:fld>
             <a:endParaRPr lang="sv-SE"/>
           </a:p>
@@ -2115,7 +2468,7 @@
           <p:cNvPr id="3" name="Footer Placeholder 2">
             <a:extLst>
               <a:ext uri="{FF2B5EF4-FFF2-40B4-BE49-F238E27FC236}">
-                <a16:creationId xmlns:a16="http://schemas.microsoft.com/office/drawing/2014/main" id="{C83839C3-024F-4B33-8B1F-ACDB236BC7A4}"/>
+                <a16:creationId xmlns:a16="http://schemas.microsoft.com/office/drawing/2014/main" id="{2DEF21F6-459B-4A59-9434-ADD59B0CFDDD}"/>
               </a:ext>
             </a:extLst>
           </p:cNvPr>
@@ -2140,7 +2493,7 @@
           <p:cNvPr id="4" name="Slide Number Placeholder 3">
             <a:extLst>
               <a:ext uri="{FF2B5EF4-FFF2-40B4-BE49-F238E27FC236}">
-                <a16:creationId xmlns:a16="http://schemas.microsoft.com/office/drawing/2014/main" id="{1C69D5BE-69F7-4DD4-8F1A-459C307151B9}"/>
+                <a16:creationId xmlns:a16="http://schemas.microsoft.com/office/drawing/2014/main" id="{8CEE90F8-9373-4C93-B401-5938FB933E4B}"/>
               </a:ext>
             </a:extLst>
           </p:cNvPr>
@@ -2167,7 +2520,7 @@
     </p:spTree>
     <p:extLst>
       <p:ext uri="{BB962C8B-B14F-4D97-AF65-F5344CB8AC3E}">
-        <p14:creationId xmlns:p14="http://schemas.microsoft.com/office/powerpoint/2010/main" val="872290298"/>
+        <p14:creationId xmlns:p14="http://schemas.microsoft.com/office/powerpoint/2010/main" val="1193718659"/>
       </p:ext>
     </p:extLst>
   </p:cSld>
@@ -2199,7 +2552,7 @@
           <p:cNvPr id="2" name="Title 1">
             <a:extLst>
               <a:ext uri="{FF2B5EF4-FFF2-40B4-BE49-F238E27FC236}">
-                <a16:creationId xmlns:a16="http://schemas.microsoft.com/office/drawing/2014/main" id="{ADF0077F-A6F2-438D-802B-9021FBC18ED3}"/>
+                <a16:creationId xmlns:a16="http://schemas.microsoft.com/office/drawing/2014/main" id="{EA71F060-1ADD-4740-BAD3-073DEA743C1D}"/>
               </a:ext>
             </a:extLst>
           </p:cNvPr>
@@ -2228,7 +2581,7 @@
               <a:rPr lang="en-US"/>
               <a:t>Click to edit Master title style</a:t>
             </a:r>
-            <a:endParaRPr lang="sv-SE"/>
+            <a:endParaRPr lang="en-SE"/>
           </a:p>
         </p:txBody>
       </p:sp>
@@ -2237,7 +2590,7 @@
           <p:cNvPr id="3" name="Content Placeholder 2">
             <a:extLst>
               <a:ext uri="{FF2B5EF4-FFF2-40B4-BE49-F238E27FC236}">
-                <a16:creationId xmlns:a16="http://schemas.microsoft.com/office/drawing/2014/main" id="{B6E44AE7-C344-46D8-A0D5-009128E1B94C}"/>
+                <a16:creationId xmlns:a16="http://schemas.microsoft.com/office/drawing/2014/main" id="{04169AC0-13C3-49AE-987F-182A5E2DED44}"/>
               </a:ext>
             </a:extLst>
           </p:cNvPr>
@@ -2289,7 +2642,7 @@
             <a:pPr lvl="0"/>
             <a:r>
               <a:rPr lang="en-US"/>
-              <a:t>Edit Master text styles</a:t>
+              <a:t>Click to edit Master text styles</a:t>
             </a:r>
           </a:p>
           <a:p>
@@ -2319,7 +2672,7 @@
               <a:rPr lang="en-US"/>
               <a:t>Fifth level</a:t>
             </a:r>
-            <a:endParaRPr lang="sv-SE"/>
+            <a:endParaRPr lang="en-SE"/>
           </a:p>
         </p:txBody>
       </p:sp>
@@ -2328,7 +2681,7 @@
           <p:cNvPr id="4" name="Text Placeholder 3">
             <a:extLst>
               <a:ext uri="{FF2B5EF4-FFF2-40B4-BE49-F238E27FC236}">
-                <a16:creationId xmlns:a16="http://schemas.microsoft.com/office/drawing/2014/main" id="{D2008DB2-DE1C-49EF-8BA8-A15F9ED7CB43}"/>
+                <a16:creationId xmlns:a16="http://schemas.microsoft.com/office/drawing/2014/main" id="{D856D642-CBB5-42E1-B66F-795BCFFD4803}"/>
               </a:ext>
             </a:extLst>
           </p:cNvPr>
@@ -2389,7 +2742,7 @@
             <a:pPr lvl="0"/>
             <a:r>
               <a:rPr lang="en-US"/>
-              <a:t>Edit Master text styles</a:t>
+              <a:t>Click to edit Master text styles</a:t>
             </a:r>
           </a:p>
         </p:txBody>
@@ -2399,7 +2752,7 @@
           <p:cNvPr id="5" name="Date Placeholder 4">
             <a:extLst>
               <a:ext uri="{FF2B5EF4-FFF2-40B4-BE49-F238E27FC236}">
-                <a16:creationId xmlns:a16="http://schemas.microsoft.com/office/drawing/2014/main" id="{8169ADA3-DD9D-44F0-8196-80F7765EB4FE}"/>
+                <a16:creationId xmlns:a16="http://schemas.microsoft.com/office/drawing/2014/main" id="{539A0934-CEF4-45F9-8EF5-11EED64DE559}"/>
               </a:ext>
             </a:extLst>
           </p:cNvPr>
@@ -2417,7 +2770,7 @@
           <a:p>
             <a:fld id="{D393A350-BAC2-46E8-98D7-627DAC8F078D}" type="datetimeFigureOut">
               <a:rPr lang="sv-SE" smtClean="0"/>
-              <a:t>2019-03-21</a:t>
+              <a:t>2020-10-23</a:t>
             </a:fld>
             <a:endParaRPr lang="sv-SE"/>
           </a:p>
@@ -2428,7 +2781,7 @@
           <p:cNvPr id="6" name="Footer Placeholder 5">
             <a:extLst>
               <a:ext uri="{FF2B5EF4-FFF2-40B4-BE49-F238E27FC236}">
-                <a16:creationId xmlns:a16="http://schemas.microsoft.com/office/drawing/2014/main" id="{BC17C5DB-B42D-4A97-AA90-37CBEB5E3399}"/>
+                <a16:creationId xmlns:a16="http://schemas.microsoft.com/office/drawing/2014/main" id="{C0A701DE-D8FC-48FA-A4F7-7C8BF553C096}"/>
               </a:ext>
             </a:extLst>
           </p:cNvPr>
@@ -2453,7 +2806,7 @@
           <p:cNvPr id="7" name="Slide Number Placeholder 6">
             <a:extLst>
               <a:ext uri="{FF2B5EF4-FFF2-40B4-BE49-F238E27FC236}">
-                <a16:creationId xmlns:a16="http://schemas.microsoft.com/office/drawing/2014/main" id="{2B4EE8A5-0905-4E6D-802D-A60937B8853D}"/>
+                <a16:creationId xmlns:a16="http://schemas.microsoft.com/office/drawing/2014/main" id="{56C8C985-E5C9-4648-8A25-29A018A1E11D}"/>
               </a:ext>
             </a:extLst>
           </p:cNvPr>
@@ -2480,7 +2833,7 @@
     </p:spTree>
     <p:extLst>
       <p:ext uri="{BB962C8B-B14F-4D97-AF65-F5344CB8AC3E}">
-        <p14:creationId xmlns:p14="http://schemas.microsoft.com/office/powerpoint/2010/main" val="2672797091"/>
+        <p14:creationId xmlns:p14="http://schemas.microsoft.com/office/powerpoint/2010/main" val="4244317783"/>
       </p:ext>
     </p:extLst>
   </p:cSld>
@@ -2512,7 +2865,7 @@
           <p:cNvPr id="2" name="Title 1">
             <a:extLst>
               <a:ext uri="{FF2B5EF4-FFF2-40B4-BE49-F238E27FC236}">
-                <a16:creationId xmlns:a16="http://schemas.microsoft.com/office/drawing/2014/main" id="{2177919B-3899-488E-AA3B-4FAD8A0C889E}"/>
+                <a16:creationId xmlns:a16="http://schemas.microsoft.com/office/drawing/2014/main" id="{AED7CE06-E89E-49DD-A799-65C9DEC421E2}"/>
               </a:ext>
             </a:extLst>
           </p:cNvPr>
@@ -2541,7 +2894,7 @@
               <a:rPr lang="en-US"/>
               <a:t>Click to edit Master title style</a:t>
             </a:r>
-            <a:endParaRPr lang="sv-SE"/>
+            <a:endParaRPr lang="en-SE"/>
           </a:p>
         </p:txBody>
       </p:sp>
@@ -2550,7 +2903,7 @@
           <p:cNvPr id="3" name="Picture Placeholder 2">
             <a:extLst>
               <a:ext uri="{FF2B5EF4-FFF2-40B4-BE49-F238E27FC236}">
-                <a16:creationId xmlns:a16="http://schemas.microsoft.com/office/drawing/2014/main" id="{3DC6EB98-7FB7-47DB-992F-172870508D2E}"/>
+                <a16:creationId xmlns:a16="http://schemas.microsoft.com/office/drawing/2014/main" id="{E7583129-424B-40B1-876D-420096C1EBA3}"/>
               </a:ext>
             </a:extLst>
           </p:cNvPr>
@@ -2608,7 +2961,7 @@
             </a:lvl9pPr>
           </a:lstStyle>
           <a:p>
-            <a:endParaRPr lang="sv-SE"/>
+            <a:endParaRPr lang="en-SE"/>
           </a:p>
         </p:txBody>
       </p:sp>
@@ -2617,7 +2970,7 @@
           <p:cNvPr id="4" name="Text Placeholder 3">
             <a:extLst>
               <a:ext uri="{FF2B5EF4-FFF2-40B4-BE49-F238E27FC236}">
-                <a16:creationId xmlns:a16="http://schemas.microsoft.com/office/drawing/2014/main" id="{577CD1ED-7862-40E1-99C5-DD9215C31F21}"/>
+                <a16:creationId xmlns:a16="http://schemas.microsoft.com/office/drawing/2014/main" id="{0A6D8287-C535-4698-9CBE-30A10F179AD7}"/>
               </a:ext>
             </a:extLst>
           </p:cNvPr>
@@ -2678,7 +3031,7 @@
             <a:pPr lvl="0"/>
             <a:r>
               <a:rPr lang="en-US"/>
-              <a:t>Edit Master text styles</a:t>
+              <a:t>Click to edit Master text styles</a:t>
             </a:r>
           </a:p>
         </p:txBody>
@@ -2688,7 +3041,7 @@
           <p:cNvPr id="5" name="Date Placeholder 4">
             <a:extLst>
               <a:ext uri="{FF2B5EF4-FFF2-40B4-BE49-F238E27FC236}">
-                <a16:creationId xmlns:a16="http://schemas.microsoft.com/office/drawing/2014/main" id="{08DA091A-51D6-481B-BF34-7B21B55D85A5}"/>
+                <a16:creationId xmlns:a16="http://schemas.microsoft.com/office/drawing/2014/main" id="{9DA1EA54-902A-4968-AFA2-22DC60E1BDE4}"/>
               </a:ext>
             </a:extLst>
           </p:cNvPr>
@@ -2706,7 +3059,7 @@
           <a:p>
             <a:fld id="{D393A350-BAC2-46E8-98D7-627DAC8F078D}" type="datetimeFigureOut">
               <a:rPr lang="sv-SE" smtClean="0"/>
-              <a:t>2019-03-21</a:t>
+              <a:t>2020-10-23</a:t>
             </a:fld>
             <a:endParaRPr lang="sv-SE"/>
           </a:p>
@@ -2717,7 +3070,7 @@
           <p:cNvPr id="6" name="Footer Placeholder 5">
             <a:extLst>
               <a:ext uri="{FF2B5EF4-FFF2-40B4-BE49-F238E27FC236}">
-                <a16:creationId xmlns:a16="http://schemas.microsoft.com/office/drawing/2014/main" id="{5ECA5E23-EED2-4086-BC49-3138EC093EF2}"/>
+                <a16:creationId xmlns:a16="http://schemas.microsoft.com/office/drawing/2014/main" id="{D3BC58EF-F581-4292-92E1-DCE5177F351A}"/>
               </a:ext>
             </a:extLst>
           </p:cNvPr>
@@ -2742,7 +3095,7 @@
           <p:cNvPr id="7" name="Slide Number Placeholder 6">
             <a:extLst>
               <a:ext uri="{FF2B5EF4-FFF2-40B4-BE49-F238E27FC236}">
-                <a16:creationId xmlns:a16="http://schemas.microsoft.com/office/drawing/2014/main" id="{EC7EBF67-1140-4B0B-B218-F1446A044D8C}"/>
+                <a16:creationId xmlns:a16="http://schemas.microsoft.com/office/drawing/2014/main" id="{AFD44B3E-CE71-4E1A-B178-0AF598C1E3F7}"/>
               </a:ext>
             </a:extLst>
           </p:cNvPr>
@@ -2769,7 +3122,7 @@
     </p:spTree>
     <p:extLst>
       <p:ext uri="{BB962C8B-B14F-4D97-AF65-F5344CB8AC3E}">
-        <p14:creationId xmlns:p14="http://schemas.microsoft.com/office/powerpoint/2010/main" val="3585513473"/>
+        <p14:creationId xmlns:p14="http://schemas.microsoft.com/office/powerpoint/2010/main" val="3205827200"/>
       </p:ext>
     </p:extLst>
   </p:cSld>
@@ -2806,7 +3159,7 @@
           <p:cNvPr id="2" name="Title Placeholder 1">
             <a:extLst>
               <a:ext uri="{FF2B5EF4-FFF2-40B4-BE49-F238E27FC236}">
-                <a16:creationId xmlns:a16="http://schemas.microsoft.com/office/drawing/2014/main" id="{F2A6C1EF-32CA-43E9-9D33-BF0F3D0D71C1}"/>
+                <a16:creationId xmlns:a16="http://schemas.microsoft.com/office/drawing/2014/main" id="{539351E1-88C9-4163-A19B-9141FB7C6E6C}"/>
               </a:ext>
             </a:extLst>
           </p:cNvPr>
@@ -2836,7 +3189,7 @@
               <a:rPr lang="en-US"/>
               <a:t>Click to edit Master title style</a:t>
             </a:r>
-            <a:endParaRPr lang="sv-SE"/>
+            <a:endParaRPr lang="en-SE"/>
           </a:p>
         </p:txBody>
       </p:sp>
@@ -2845,7 +3198,7 @@
           <p:cNvPr id="3" name="Text Placeholder 2">
             <a:extLst>
               <a:ext uri="{FF2B5EF4-FFF2-40B4-BE49-F238E27FC236}">
-                <a16:creationId xmlns:a16="http://schemas.microsoft.com/office/drawing/2014/main" id="{FA00A6F0-EBE6-40E5-B89E-F2DE77F65536}"/>
+                <a16:creationId xmlns:a16="http://schemas.microsoft.com/office/drawing/2014/main" id="{56E83237-6C43-40F8-99B2-FE72E568877E}"/>
               </a:ext>
             </a:extLst>
           </p:cNvPr>
@@ -2874,7 +3227,7 @@
             <a:pPr lvl="0"/>
             <a:r>
               <a:rPr lang="en-US"/>
-              <a:t>Edit Master text styles</a:t>
+              <a:t>Click to edit Master text styles</a:t>
             </a:r>
           </a:p>
           <a:p>
@@ -2904,7 +3257,7 @@
               <a:rPr lang="en-US"/>
               <a:t>Fifth level</a:t>
             </a:r>
-            <a:endParaRPr lang="sv-SE"/>
+            <a:endParaRPr lang="en-SE"/>
           </a:p>
         </p:txBody>
       </p:sp>
@@ -2913,7 +3266,7 @@
           <p:cNvPr id="4" name="Date Placeholder 3">
             <a:extLst>
               <a:ext uri="{FF2B5EF4-FFF2-40B4-BE49-F238E27FC236}">
-                <a16:creationId xmlns:a16="http://schemas.microsoft.com/office/drawing/2014/main" id="{E3598EBF-90DC-407D-91AE-8BD3D0376778}"/>
+                <a16:creationId xmlns:a16="http://schemas.microsoft.com/office/drawing/2014/main" id="{67441113-1085-4FDB-87F1-C8494F29A764}"/>
               </a:ext>
             </a:extLst>
           </p:cNvPr>
@@ -2949,7 +3302,7 @@
           <a:p>
             <a:fld id="{D393A350-BAC2-46E8-98D7-627DAC8F078D}" type="datetimeFigureOut">
               <a:rPr lang="sv-SE" smtClean="0"/>
-              <a:t>2019-03-21</a:t>
+              <a:t>2020-10-23</a:t>
             </a:fld>
             <a:endParaRPr lang="sv-SE"/>
           </a:p>
@@ -2960,7 +3313,7 @@
           <p:cNvPr id="5" name="Footer Placeholder 4">
             <a:extLst>
               <a:ext uri="{FF2B5EF4-FFF2-40B4-BE49-F238E27FC236}">
-                <a16:creationId xmlns:a16="http://schemas.microsoft.com/office/drawing/2014/main" id="{80BB82DB-A93F-4E89-BA0D-B471F0F9BC2D}"/>
+                <a16:creationId xmlns:a16="http://schemas.microsoft.com/office/drawing/2014/main" id="{498F280C-B709-41CA-8A4C-A9490FD46E42}"/>
               </a:ext>
             </a:extLst>
           </p:cNvPr>
@@ -3003,7 +3356,7 @@
           <p:cNvPr id="6" name="Slide Number Placeholder 5">
             <a:extLst>
               <a:ext uri="{FF2B5EF4-FFF2-40B4-BE49-F238E27FC236}">
-                <a16:creationId xmlns:a16="http://schemas.microsoft.com/office/drawing/2014/main" id="{E56D7F5F-CC40-41A8-9FF4-F273F610F33E}"/>
+                <a16:creationId xmlns:a16="http://schemas.microsoft.com/office/drawing/2014/main" id="{5B0B0465-A60B-4519-8127-1A092BA3B013}"/>
               </a:ext>
             </a:extLst>
           </p:cNvPr>
@@ -3045,26 +3398,80 @@
           </a:p>
         </p:txBody>
       </p:sp>
+      <p:sp>
+        <p:nvSpPr>
+          <p:cNvPr id="7" name="MSIPCMContentMarking" descr="{&quot;HashCode&quot;:-1371340197,&quot;Placement&quot;:&quot;Footer&quot;,&quot;Top&quot;:519.343,&quot;Left&quot;:440.861267,&quot;SlideWidth&quot;:960,&quot;SlideHeight&quot;:540}">
+            <a:extLst>
+              <a:ext uri="{FF2B5EF4-FFF2-40B4-BE49-F238E27FC236}">
+                <a16:creationId xmlns:a16="http://schemas.microsoft.com/office/drawing/2014/main" id="{D1AEE483-412D-41FF-8147-9112088F9917}"/>
+              </a:ext>
+            </a:extLst>
+          </p:cNvPr>
+          <p:cNvSpPr txBox="1"/>
+          <p:nvPr userDrawn="1"/>
+        </p:nvSpPr>
+        <p:spPr>
+          <a:xfrm>
+            <a:off x="5598938" y="6595656"/>
+            <a:ext cx="994124" cy="262344"/>
+          </a:xfrm>
+          <a:prstGeom prst="rect">
+            <a:avLst/>
+          </a:prstGeom>
+          <a:noFill/>
+        </p:spPr>
+        <p:txBody>
+          <a:bodyPr vert="horz" wrap="square" lIns="0" tIns="0" rIns="0" bIns="0" rtlCol="0" anchor="ctr" anchorCtr="1">
+            <a:spAutoFit/>
+          </a:bodyPr>
+          <a:lstStyle/>
+          <a:p>
+            <a:pPr algn="ctr">
+              <a:spcBef>
+                <a:spcPts val="0"/>
+              </a:spcBef>
+              <a:spcAft>
+                <a:spcPts val="0"/>
+              </a:spcAft>
+            </a:pPr>
+            <a:r>
+              <a:rPr lang="sv-SE" sz="1000">
+                <a:solidFill>
+                  <a:srgbClr val="000000"/>
+                </a:solidFill>
+                <a:latin typeface="Calibri" panose="020F0502020204030204" pitchFamily="34" charset="0"/>
+              </a:rPr>
+              <a:t>CAB - Internal</a:t>
+            </a:r>
+            <a:endParaRPr lang="en-SE" sz="1000">
+              <a:solidFill>
+                <a:srgbClr val="000000"/>
+              </a:solidFill>
+              <a:latin typeface="Calibri" panose="020F0502020204030204" pitchFamily="34" charset="0"/>
+            </a:endParaRPr>
+          </a:p>
+        </p:txBody>
+      </p:sp>
     </p:spTree>
     <p:extLst>
       <p:ext uri="{BB962C8B-B14F-4D97-AF65-F5344CB8AC3E}">
-        <p14:creationId xmlns:p14="http://schemas.microsoft.com/office/powerpoint/2010/main" val="2541057013"/>
+        <p14:creationId xmlns:p14="http://schemas.microsoft.com/office/powerpoint/2010/main" val="543129507"/>
       </p:ext>
     </p:extLst>
   </p:cSld>
   <p:clrMap bg1="lt1" tx1="dk1" bg2="lt2" tx2="dk2" accent1="accent1" accent2="accent2" accent3="accent3" accent4="accent4" accent5="accent5" accent6="accent6" hlink="hlink" folHlink="folHlink"/>
   <p:sldLayoutIdLst>
-    <p:sldLayoutId id="2147483649" r:id="rId1"/>
-    <p:sldLayoutId id="2147483650" r:id="rId2"/>
-    <p:sldLayoutId id="2147483651" r:id="rId3"/>
-    <p:sldLayoutId id="2147483652" r:id="rId4"/>
-    <p:sldLayoutId id="2147483653" r:id="rId5"/>
-    <p:sldLayoutId id="2147483654" r:id="rId6"/>
-    <p:sldLayoutId id="2147483655" r:id="rId7"/>
-    <p:sldLayoutId id="2147483656" r:id="rId8"/>
-    <p:sldLayoutId id="2147483657" r:id="rId9"/>
-    <p:sldLayoutId id="2147483658" r:id="rId10"/>
-    <p:sldLayoutId id="2147483659" r:id="rId11"/>
+    <p:sldLayoutId id="2147483702" r:id="rId1"/>
+    <p:sldLayoutId id="2147483703" r:id="rId2"/>
+    <p:sldLayoutId id="2147483704" r:id="rId3"/>
+    <p:sldLayoutId id="2147483705" r:id="rId4"/>
+    <p:sldLayoutId id="2147483706" r:id="rId5"/>
+    <p:sldLayoutId id="2147483707" r:id="rId6"/>
+    <p:sldLayoutId id="2147483708" r:id="rId7"/>
+    <p:sldLayoutId id="2147483709" r:id="rId8"/>
+    <p:sldLayoutId id="2147483710" r:id="rId9"/>
+    <p:sldLayoutId id="2147483711" r:id="rId10"/>
+    <p:sldLayoutId id="2147483712" r:id="rId11"/>
   </p:sldLayoutIdLst>
   <p:txStyles>
     <p:titleStyle>
@@ -3252,7 +3659,7 @@
     </p:bodyStyle>
     <p:otherStyle>
       <a:defPPr>
-        <a:defRPr lang="sv-SE"/>
+        <a:defRPr lang="en-SE"/>
       </a:defPPr>
       <a:lvl1pPr marL="0" algn="l" defTabSz="914400" rtl="0" eaLnBrk="1" latinLnBrk="0" hangingPunct="1">
         <a:defRPr sz="1800" kern="1200">
@@ -3350,7 +3757,7 @@
 </file>
 
 <file path=ppt/slides/slide1.xml><?xml version="1.0" encoding="utf-8"?>
-<p:sld xmlns:a="http://schemas.openxmlformats.org/drawingml/2006/main" xmlns:r="http://schemas.openxmlformats.org/officeDocument/2006/relationships" xmlns:p="http://schemas.openxmlformats.org/presentationml/2006/main">
+<p:sld xmlns:a="http://schemas.openxmlformats.org/drawingml/2006/main" xmlns:r="http://schemas.openxmlformats.org/officeDocument/2006/relationships" xmlns:p="http://schemas.openxmlformats.org/presentationml/2006/main" showMasterSp="0">
   <p:cSld>
     <p:spTree>
       <p:nvGrpSpPr>
@@ -3879,8 +4286,8 @@
         </p:nvSpPr>
         <p:spPr>
           <a:xfrm>
-            <a:off x="2971799" y="1362360"/>
-            <a:ext cx="803563" cy="1052946"/>
+            <a:off x="2971799" y="1362361"/>
+            <a:ext cx="803563" cy="258869"/>
           </a:xfrm>
           <a:prstGeom prst="roundRect">
             <a:avLst/>
@@ -3932,7 +4339,7 @@
         <p:spPr>
           <a:xfrm>
             <a:off x="5144654" y="1362360"/>
-            <a:ext cx="803563" cy="1052946"/>
+            <a:ext cx="803563" cy="540580"/>
           </a:xfrm>
           <a:prstGeom prst="roundRect">
             <a:avLst/>
@@ -3980,7 +4387,111 @@
         </p:nvSpPr>
         <p:spPr>
           <a:xfrm>
-            <a:off x="6308438" y="1353127"/>
+            <a:off x="2971798" y="1778130"/>
+            <a:ext cx="803563" cy="637176"/>
+          </a:xfrm>
+          <a:prstGeom prst="roundRect">
+            <a:avLst/>
+          </a:prstGeom>
+          <a:solidFill>
+            <a:schemeClr val="accent6"/>
+          </a:solidFill>
+          <a:ln>
+            <a:noFill/>
+          </a:ln>
+        </p:spPr>
+        <p:style>
+          <a:lnRef idx="2">
+            <a:schemeClr val="accent1">
+              <a:shade val="50000"/>
+            </a:schemeClr>
+          </a:lnRef>
+          <a:fillRef idx="1">
+            <a:schemeClr val="accent1"/>
+          </a:fillRef>
+          <a:effectRef idx="0">
+            <a:schemeClr val="accent1"/>
+          </a:effectRef>
+          <a:fontRef idx="minor">
+            <a:schemeClr val="lt1"/>
+          </a:fontRef>
+        </p:style>
+        <p:txBody>
+          <a:bodyPr rtlCol="0" anchor="ctr"/>
+          <a:lstStyle/>
+          <a:p>
+            <a:pPr algn="ctr"/>
+            <a:endParaRPr lang="sv-SE"/>
+          </a:p>
+        </p:txBody>
+      </p:sp>
+      <p:sp>
+        <p:nvSpPr>
+          <p:cNvPr id="15" name="Rectangle: Rounded Corners 14">
+            <a:extLst>
+              <a:ext uri="{FF2B5EF4-FFF2-40B4-BE49-F238E27FC236}">
+                <a16:creationId xmlns:a16="http://schemas.microsoft.com/office/drawing/2014/main" id="{4AFDF92F-B4EE-4D52-9E7B-2B17ED4C8B0D}"/>
+              </a:ext>
+            </a:extLst>
+          </p:cNvPr>
+          <p:cNvSpPr/>
+          <p:nvPr/>
+        </p:nvSpPr>
+        <p:spPr>
+          <a:xfrm>
+            <a:off x="8446654" y="1362361"/>
+            <a:ext cx="803563" cy="415768"/>
+          </a:xfrm>
+          <a:prstGeom prst="roundRect">
+            <a:avLst/>
+          </a:prstGeom>
+          <a:solidFill>
+            <a:schemeClr val="accent2"/>
+          </a:solidFill>
+          <a:ln>
+            <a:noFill/>
+          </a:ln>
+        </p:spPr>
+        <p:style>
+          <a:lnRef idx="2">
+            <a:schemeClr val="accent1">
+              <a:shade val="50000"/>
+            </a:schemeClr>
+          </a:lnRef>
+          <a:fillRef idx="1">
+            <a:schemeClr val="accent1"/>
+          </a:fillRef>
+          <a:effectRef idx="0">
+            <a:schemeClr val="accent1"/>
+          </a:effectRef>
+          <a:fontRef idx="minor">
+            <a:schemeClr val="lt1"/>
+          </a:fontRef>
+        </p:style>
+        <p:txBody>
+          <a:bodyPr rtlCol="0" anchor="ctr"/>
+          <a:lstStyle/>
+          <a:p>
+            <a:pPr algn="ctr"/>
+            <a:endParaRPr lang="sv-SE"/>
+          </a:p>
+        </p:txBody>
+      </p:sp>
+      <p:sp>
+        <p:nvSpPr>
+          <p:cNvPr id="16" name="Rectangle: Rounded Corners 15">
+            <a:extLst>
+              <a:ext uri="{FF2B5EF4-FFF2-40B4-BE49-F238E27FC236}">
+                <a16:creationId xmlns:a16="http://schemas.microsoft.com/office/drawing/2014/main" id="{C70C448A-C541-4562-8458-BB68844A7EAC}"/>
+              </a:ext>
+            </a:extLst>
+          </p:cNvPr>
+          <p:cNvSpPr/>
+          <p:nvPr/>
+        </p:nvSpPr>
+        <p:spPr>
+          <a:xfrm>
+            <a:off x="9591966" y="1353127"/>
             <a:ext cx="803563" cy="1052946"/>
           </a:xfrm>
           <a:prstGeom prst="roundRect">
@@ -4020,10 +4531,10 @@
       </p:sp>
       <p:sp>
         <p:nvSpPr>
-          <p:cNvPr id="15" name="Rectangle: Rounded Corners 14">
-            <a:extLst>
-              <a:ext uri="{FF2B5EF4-FFF2-40B4-BE49-F238E27FC236}">
-                <a16:creationId xmlns:a16="http://schemas.microsoft.com/office/drawing/2014/main" id="{4AFDF92F-B4EE-4D52-9E7B-2B17ED4C8B0D}"/>
+          <p:cNvPr id="17" name="Rectangle: Rounded Corners 16">
+            <a:extLst>
+              <a:ext uri="{FF2B5EF4-FFF2-40B4-BE49-F238E27FC236}">
+                <a16:creationId xmlns:a16="http://schemas.microsoft.com/office/drawing/2014/main" id="{C0D043F4-F750-4961-91D2-3B4020DB5ED3}"/>
               </a:ext>
             </a:extLst>
           </p:cNvPr>
@@ -4032,8 +4543,60 @@
         </p:nvSpPr>
         <p:spPr>
           <a:xfrm>
-            <a:off x="8446654" y="1362360"/>
-            <a:ext cx="803563" cy="1052946"/>
+            <a:off x="6243785" y="1362360"/>
+            <a:ext cx="803563" cy="540579"/>
+          </a:xfrm>
+          <a:prstGeom prst="roundRect">
+            <a:avLst/>
+          </a:prstGeom>
+          <a:solidFill>
+            <a:schemeClr val="accent6"/>
+          </a:solidFill>
+          <a:ln>
+            <a:noFill/>
+          </a:ln>
+        </p:spPr>
+        <p:style>
+          <a:lnRef idx="2">
+            <a:schemeClr val="accent1">
+              <a:shade val="50000"/>
+            </a:schemeClr>
+          </a:lnRef>
+          <a:fillRef idx="1">
+            <a:schemeClr val="accent1"/>
+          </a:fillRef>
+          <a:effectRef idx="0">
+            <a:schemeClr val="accent1"/>
+          </a:effectRef>
+          <a:fontRef idx="minor">
+            <a:schemeClr val="lt1"/>
+          </a:fontRef>
+        </p:style>
+        <p:txBody>
+          <a:bodyPr rtlCol="0" anchor="ctr"/>
+          <a:lstStyle/>
+          <a:p>
+            <a:pPr algn="ctr"/>
+            <a:endParaRPr lang="sv-SE"/>
+          </a:p>
+        </p:txBody>
+      </p:sp>
+      <p:sp>
+        <p:nvSpPr>
+          <p:cNvPr id="18" name="Rectangle: Rounded Corners 17">
+            <a:extLst>
+              <a:ext uri="{FF2B5EF4-FFF2-40B4-BE49-F238E27FC236}">
+                <a16:creationId xmlns:a16="http://schemas.microsoft.com/office/drawing/2014/main" id="{80D8F8C5-95AC-4D33-936D-A993F82C8E65}"/>
+              </a:ext>
+            </a:extLst>
+          </p:cNvPr>
+          <p:cNvSpPr/>
+          <p:nvPr/>
+        </p:nvSpPr>
+        <p:spPr>
+          <a:xfrm>
+            <a:off x="5144653" y="2084173"/>
+            <a:ext cx="1902695" cy="321900"/>
           </a:xfrm>
           <a:prstGeom prst="roundRect">
             <a:avLst/>
@@ -4072,10 +4635,10 @@
       </p:sp>
       <p:sp>
         <p:nvSpPr>
-          <p:cNvPr id="16" name="Rectangle: Rounded Corners 15">
-            <a:extLst>
-              <a:ext uri="{FF2B5EF4-FFF2-40B4-BE49-F238E27FC236}">
-                <a16:creationId xmlns:a16="http://schemas.microsoft.com/office/drawing/2014/main" id="{C70C448A-C541-4562-8458-BB68844A7EAC}"/>
+          <p:cNvPr id="19" name="Rectangle: Rounded Corners 18">
+            <a:extLst>
+              <a:ext uri="{FF2B5EF4-FFF2-40B4-BE49-F238E27FC236}">
+                <a16:creationId xmlns:a16="http://schemas.microsoft.com/office/drawing/2014/main" id="{5E29E6B9-D43E-4539-965D-BDF78017823C}"/>
               </a:ext>
             </a:extLst>
           </p:cNvPr>
@@ -4084,15 +4647,12 @@
         </p:nvSpPr>
         <p:spPr>
           <a:xfrm>
-            <a:off x="9591966" y="1353127"/>
-            <a:ext cx="803563" cy="1052946"/>
+            <a:off x="8446653" y="1993556"/>
+            <a:ext cx="803563" cy="415767"/>
           </a:xfrm>
           <a:prstGeom prst="roundRect">
             <a:avLst/>
           </a:prstGeom>
-          <a:solidFill>
-            <a:schemeClr val="accent6"/>
-          </a:solidFill>
           <a:ln>
             <a:noFill/>
           </a:ln>
@@ -10679,4 +11239,299 @@
     </a:ext>
   </a:extLst>
 </a:theme>
+</file>
+
+<file path=ppt/theme/theme2.xml><?xml version="1.0" encoding="utf-8"?>
+<a:theme xmlns:a="http://schemas.openxmlformats.org/drawingml/2006/main" name="Office Theme">
+  <a:themeElements>
+    <a:clrScheme name="Office">
+      <a:dk1>
+        <a:sysClr val="windowText" lastClr="000000"/>
+      </a:dk1>
+      <a:lt1>
+        <a:sysClr val="window" lastClr="FFFFFF"/>
+      </a:lt1>
+      <a:dk2>
+        <a:srgbClr val="44546A"/>
+      </a:dk2>
+      <a:lt2>
+        <a:srgbClr val="E7E6E6"/>
+      </a:lt2>
+      <a:accent1>
+        <a:srgbClr val="4472C4"/>
+      </a:accent1>
+      <a:accent2>
+        <a:srgbClr val="ED7D31"/>
+      </a:accent2>
+      <a:accent3>
+        <a:srgbClr val="A5A5A5"/>
+      </a:accent3>
+      <a:accent4>
+        <a:srgbClr val="FFC000"/>
+      </a:accent4>
+      <a:accent5>
+        <a:srgbClr val="5B9BD5"/>
+      </a:accent5>
+      <a:accent6>
+        <a:srgbClr val="70AD47"/>
+      </a:accent6>
+      <a:hlink>
+        <a:srgbClr val="0563C1"/>
+      </a:hlink>
+      <a:folHlink>
+        <a:srgbClr val="954F72"/>
+      </a:folHlink>
+    </a:clrScheme>
+    <a:fontScheme name="Office">
+      <a:majorFont>
+        <a:latin typeface="Calibri Light" panose="020F0302020204030204"/>
+        <a:ea typeface=""/>
+        <a:cs typeface=""/>
+        <a:font script="Jpan" typeface="游ゴシック Light"/>
+        <a:font script="Hang" typeface="맑은 고딕"/>
+        <a:font script="Hans" typeface="等线 Light"/>
+        <a:font script="Hant" typeface="新細明體"/>
+        <a:font script="Arab" typeface="Times New Roman"/>
+        <a:font script="Hebr" typeface="Times New Roman"/>
+        <a:font script="Thai" typeface="Angsana New"/>
+        <a:font script="Ethi" typeface="Nyala"/>
+        <a:font script="Beng" typeface="Vrinda"/>
+        <a:font script="Gujr" typeface="Shruti"/>
+        <a:font script="Khmr" typeface="MoolBoran"/>
+        <a:font script="Knda" typeface="Tunga"/>
+        <a:font script="Guru" typeface="Raavi"/>
+        <a:font script="Cans" typeface="Euphemia"/>
+        <a:font script="Cher" typeface="Plantagenet Cherokee"/>
+        <a:font script="Yiii" typeface="Microsoft Yi Baiti"/>
+        <a:font script="Tibt" typeface="Microsoft Himalaya"/>
+        <a:font script="Thaa" typeface="MV Boli"/>
+        <a:font script="Deva" typeface="Mangal"/>
+        <a:font script="Telu" typeface="Gautami"/>
+        <a:font script="Taml" typeface="Latha"/>
+        <a:font script="Syrc" typeface="Estrangelo Edessa"/>
+        <a:font script="Orya" typeface="Kalinga"/>
+        <a:font script="Mlym" typeface="Kartika"/>
+        <a:font script="Laoo" typeface="DokChampa"/>
+        <a:font script="Sinh" typeface="Iskoola Pota"/>
+        <a:font script="Mong" typeface="Mongolian Baiti"/>
+        <a:font script="Viet" typeface="Times New Roman"/>
+        <a:font script="Uigh" typeface="Microsoft Uighur"/>
+        <a:font script="Geor" typeface="Sylfaen"/>
+        <a:font script="Armn" typeface="Arial"/>
+        <a:font script="Bugi" typeface="Leelawadee UI"/>
+        <a:font script="Bopo" typeface="Microsoft JhengHei"/>
+        <a:font script="Java" typeface="Javanese Text"/>
+        <a:font script="Lisu" typeface="Segoe UI"/>
+        <a:font script="Mymr" typeface="Myanmar Text"/>
+        <a:font script="Nkoo" typeface="Ebrima"/>
+        <a:font script="Olck" typeface="Nirmala UI"/>
+        <a:font script="Osma" typeface="Ebrima"/>
+        <a:font script="Phag" typeface="Phagspa"/>
+        <a:font script="Syrn" typeface="Estrangelo Edessa"/>
+        <a:font script="Syrj" typeface="Estrangelo Edessa"/>
+        <a:font script="Syre" typeface="Estrangelo Edessa"/>
+        <a:font script="Sora" typeface="Nirmala UI"/>
+        <a:font script="Tale" typeface="Microsoft Tai Le"/>
+        <a:font script="Talu" typeface="Microsoft New Tai Lue"/>
+        <a:font script="Tfng" typeface="Ebrima"/>
+      </a:majorFont>
+      <a:minorFont>
+        <a:latin typeface="Calibri" panose="020F0502020204030204"/>
+        <a:ea typeface=""/>
+        <a:cs typeface=""/>
+        <a:font script="Jpan" typeface="游ゴシック"/>
+        <a:font script="Hang" typeface="맑은 고딕"/>
+        <a:font script="Hans" typeface="等线"/>
+        <a:font script="Hant" typeface="新細明體"/>
+        <a:font script="Arab" typeface="Arial"/>
+        <a:font script="Hebr" typeface="Arial"/>
+        <a:font script="Thai" typeface="Cordia New"/>
+        <a:font script="Ethi" typeface="Nyala"/>
+        <a:font script="Beng" typeface="Vrinda"/>
+        <a:font script="Gujr" typeface="Shruti"/>
+        <a:font script="Khmr" typeface="DaunPenh"/>
+        <a:font script="Knda" typeface="Tunga"/>
+        <a:font script="Guru" typeface="Raavi"/>
+        <a:font script="Cans" typeface="Euphemia"/>
+        <a:font script="Cher" typeface="Plantagenet Cherokee"/>
+        <a:font script="Yiii" typeface="Microsoft Yi Baiti"/>
+        <a:font script="Tibt" typeface="Microsoft Himalaya"/>
+        <a:font script="Thaa" typeface="MV Boli"/>
+        <a:font script="Deva" typeface="Mangal"/>
+        <a:font script="Telu" typeface="Gautami"/>
+        <a:font script="Taml" typeface="Latha"/>
+        <a:font script="Syrc" typeface="Estrangelo Edessa"/>
+        <a:font script="Orya" typeface="Kalinga"/>
+        <a:font script="Mlym" typeface="Kartika"/>
+        <a:font script="Laoo" typeface="DokChampa"/>
+        <a:font script="Sinh" typeface="Iskoola Pota"/>
+        <a:font script="Mong" typeface="Mongolian Baiti"/>
+        <a:font script="Viet" typeface="Arial"/>
+        <a:font script="Uigh" typeface="Microsoft Uighur"/>
+        <a:font script="Geor" typeface="Sylfaen"/>
+        <a:font script="Armn" typeface="Arial"/>
+        <a:font script="Bugi" typeface="Leelawadee UI"/>
+        <a:font script="Bopo" typeface="Microsoft JhengHei"/>
+        <a:font script="Java" typeface="Javanese Text"/>
+        <a:font script="Lisu" typeface="Segoe UI"/>
+        <a:font script="Mymr" typeface="Myanmar Text"/>
+        <a:font script="Nkoo" typeface="Ebrima"/>
+        <a:font script="Olck" typeface="Nirmala UI"/>
+        <a:font script="Osma" typeface="Ebrima"/>
+        <a:font script="Phag" typeface="Phagspa"/>
+        <a:font script="Syrn" typeface="Estrangelo Edessa"/>
+        <a:font script="Syrj" typeface="Estrangelo Edessa"/>
+        <a:font script="Syre" typeface="Estrangelo Edessa"/>
+        <a:font script="Sora" typeface="Nirmala UI"/>
+        <a:font script="Tale" typeface="Microsoft Tai Le"/>
+        <a:font script="Talu" typeface="Microsoft New Tai Lue"/>
+        <a:font script="Tfng" typeface="Ebrima"/>
+      </a:minorFont>
+    </a:fontScheme>
+    <a:fmtScheme name="Office">
+      <a:fillStyleLst>
+        <a:solidFill>
+          <a:schemeClr val="phClr"/>
+        </a:solidFill>
+        <a:gradFill rotWithShape="1">
+          <a:gsLst>
+            <a:gs pos="0">
+              <a:schemeClr val="phClr">
+                <a:lumMod val="110000"/>
+                <a:satMod val="105000"/>
+                <a:tint val="67000"/>
+              </a:schemeClr>
+            </a:gs>
+            <a:gs pos="50000">
+              <a:schemeClr val="phClr">
+                <a:lumMod val="105000"/>
+                <a:satMod val="103000"/>
+                <a:tint val="73000"/>
+              </a:schemeClr>
+            </a:gs>
+            <a:gs pos="100000">
+              <a:schemeClr val="phClr">
+                <a:lumMod val="105000"/>
+                <a:satMod val="109000"/>
+                <a:tint val="81000"/>
+              </a:schemeClr>
+            </a:gs>
+          </a:gsLst>
+          <a:lin ang="5400000" scaled="0"/>
+        </a:gradFill>
+        <a:gradFill rotWithShape="1">
+          <a:gsLst>
+            <a:gs pos="0">
+              <a:schemeClr val="phClr">
+                <a:satMod val="103000"/>
+                <a:lumMod val="102000"/>
+                <a:tint val="94000"/>
+              </a:schemeClr>
+            </a:gs>
+            <a:gs pos="50000">
+              <a:schemeClr val="phClr">
+                <a:satMod val="110000"/>
+                <a:lumMod val="100000"/>
+                <a:shade val="100000"/>
+              </a:schemeClr>
+            </a:gs>
+            <a:gs pos="100000">
+              <a:schemeClr val="phClr">
+                <a:lumMod val="99000"/>
+                <a:satMod val="120000"/>
+                <a:shade val="78000"/>
+              </a:schemeClr>
+            </a:gs>
+          </a:gsLst>
+          <a:lin ang="5400000" scaled="0"/>
+        </a:gradFill>
+      </a:fillStyleLst>
+      <a:lnStyleLst>
+        <a:ln w="6350" cap="flat" cmpd="sng" algn="ctr">
+          <a:solidFill>
+            <a:schemeClr val="phClr"/>
+          </a:solidFill>
+          <a:prstDash val="solid"/>
+          <a:miter lim="800000"/>
+        </a:ln>
+        <a:ln w="12700" cap="flat" cmpd="sng" algn="ctr">
+          <a:solidFill>
+            <a:schemeClr val="phClr"/>
+          </a:solidFill>
+          <a:prstDash val="solid"/>
+          <a:miter lim="800000"/>
+        </a:ln>
+        <a:ln w="19050" cap="flat" cmpd="sng" algn="ctr">
+          <a:solidFill>
+            <a:schemeClr val="phClr"/>
+          </a:solidFill>
+          <a:prstDash val="solid"/>
+          <a:miter lim="800000"/>
+        </a:ln>
+      </a:lnStyleLst>
+      <a:effectStyleLst>
+        <a:effectStyle>
+          <a:effectLst/>
+        </a:effectStyle>
+        <a:effectStyle>
+          <a:effectLst/>
+        </a:effectStyle>
+        <a:effectStyle>
+          <a:effectLst>
+            <a:outerShdw blurRad="57150" dist="19050" dir="5400000" algn="ctr" rotWithShape="0">
+              <a:srgbClr val="000000">
+                <a:alpha val="63000"/>
+              </a:srgbClr>
+            </a:outerShdw>
+          </a:effectLst>
+        </a:effectStyle>
+      </a:effectStyleLst>
+      <a:bgFillStyleLst>
+        <a:solidFill>
+          <a:schemeClr val="phClr"/>
+        </a:solidFill>
+        <a:solidFill>
+          <a:schemeClr val="phClr">
+            <a:tint val="95000"/>
+            <a:satMod val="170000"/>
+          </a:schemeClr>
+        </a:solidFill>
+        <a:gradFill rotWithShape="1">
+          <a:gsLst>
+            <a:gs pos="0">
+              <a:schemeClr val="phClr">
+                <a:tint val="93000"/>
+                <a:satMod val="150000"/>
+                <a:shade val="98000"/>
+                <a:lumMod val="102000"/>
+              </a:schemeClr>
+            </a:gs>
+            <a:gs pos="50000">
+              <a:schemeClr val="phClr">
+                <a:tint val="98000"/>
+                <a:satMod val="130000"/>
+                <a:shade val="90000"/>
+                <a:lumMod val="103000"/>
+              </a:schemeClr>
+            </a:gs>
+            <a:gs pos="100000">
+              <a:schemeClr val="phClr">
+                <a:shade val="63000"/>
+                <a:satMod val="120000"/>
+              </a:schemeClr>
+            </a:gs>
+          </a:gsLst>
+          <a:lin ang="5400000" scaled="0"/>
+        </a:gradFill>
+      </a:bgFillStyleLst>
+    </a:fmtScheme>
+  </a:themeElements>
+  <a:objectDefaults/>
+  <a:extraClrSchemeLst/>
+  <a:extLst>
+    <a:ext uri="{05A4C25C-085E-4340-85A3-A5531E510DB2}">
+      <thm15:themeFamily xmlns:thm15="http://schemas.microsoft.com/office/thememl/2012/main" name="Office Theme" id="{62F939B6-93AF-4DB8-9C6B-D6C7DFDC589F}" vid="{4A3C46E8-61CC-4603-A589-7422A47A8E4A}"/>
+    </a:ext>
+  </a:extLst>
+</a:theme>
 </file>
</xml_diff>